<commit_message>
update files for sprint2
</commit_message>
<xml_diff>
--- a/documents/Burndown Charts.pptx
+++ b/documents/Burndown Charts.pptx
@@ -5,15 +5,18 @@
     <p:sldMasterId id="2147483648" r:id="rId4"/>
   </p:sldMasterIdLst>
   <p:notesMasterIdLst>
-    <p:notesMasterId r:id="rId8"/>
+    <p:notesMasterId r:id="rId11"/>
   </p:notesMasterIdLst>
   <p:handoutMasterIdLst>
-    <p:handoutMasterId r:id="rId9"/>
+    <p:handoutMasterId r:id="rId12"/>
   </p:handoutMasterIdLst>
   <p:sldIdLst>
     <p:sldId id="292" r:id="rId5"/>
     <p:sldId id="307" r:id="rId6"/>
     <p:sldId id="293" r:id="rId7"/>
+    <p:sldId id="308" r:id="rId8"/>
+    <p:sldId id="310" r:id="rId9"/>
+    <p:sldId id="311" r:id="rId10"/>
   </p:sldIdLst>
   <p:sldSz cx="12192000" cy="6858000"/>
   <p:notesSz cx="6858000" cy="9144000"/>
@@ -2568,6 +2571,1904 @@
 </c:chartSpace>
 </file>
 
+<file path=ppt/charts/chart6.xml><?xml version="1.0" encoding="utf-8"?>
+<c:chartSpace xmlns:c="http://schemas.openxmlformats.org/drawingml/2006/chart" xmlns:a="http://schemas.openxmlformats.org/drawingml/2006/main" xmlns:r="http://schemas.openxmlformats.org/officeDocument/2006/relationships" xmlns:c16r2="http://schemas.microsoft.com/office/drawing/2015/06/chart">
+  <c:date1904 val="0"/>
+  <c:lang val="en-US"/>
+  <c:roundedCorners val="0"/>
+  <mc:AlternateContent xmlns:mc="http://schemas.openxmlformats.org/markup-compatibility/2006">
+    <mc:Choice xmlns:c14="http://schemas.microsoft.com/office/drawing/2007/8/2/chart" Requires="c14">
+      <c14:style val="102"/>
+    </mc:Choice>
+    <mc:Fallback>
+      <c:style val="2"/>
+    </mc:Fallback>
+  </mc:AlternateContent>
+  <c:chart>
+    <c:title>
+      <c:tx>
+        <c:rich>
+          <a:bodyPr rot="0" spcFirstLastPara="1" vertOverflow="ellipsis" vert="horz" wrap="square" anchor="ctr" anchorCtr="1"/>
+          <a:lstStyle/>
+          <a:p>
+            <a:pPr>
+              <a:defRPr sz="1862" b="0" i="0" u="none" strike="noStrike" kern="1200" spc="0" baseline="0">
+                <a:solidFill>
+                  <a:schemeClr val="tx1">
+                    <a:lumMod val="65000"/>
+                    <a:lumOff val="35000"/>
+                  </a:schemeClr>
+                </a:solidFill>
+                <a:latin typeface="+mn-lt"/>
+                <a:ea typeface="+mn-ea"/>
+                <a:cs typeface="+mn-cs"/>
+              </a:defRPr>
+            </a:pPr>
+            <a:r>
+              <a:rPr lang="en-US" dirty="0"/>
+              <a:t>Sprint 2 Velocity</a:t>
+            </a:r>
+          </a:p>
+        </c:rich>
+      </c:tx>
+      <c:overlay val="0"/>
+      <c:spPr>
+        <a:noFill/>
+        <a:ln>
+          <a:noFill/>
+        </a:ln>
+        <a:effectLst/>
+      </c:spPr>
+      <c:txPr>
+        <a:bodyPr rot="0" spcFirstLastPara="1" vertOverflow="ellipsis" vert="horz" wrap="square" anchor="ctr" anchorCtr="1"/>
+        <a:lstStyle/>
+        <a:p>
+          <a:pPr>
+            <a:defRPr sz="1862" b="0" i="0" u="none" strike="noStrike" kern="1200" spc="0" baseline="0">
+              <a:solidFill>
+                <a:schemeClr val="tx1">
+                  <a:lumMod val="65000"/>
+                  <a:lumOff val="35000"/>
+                </a:schemeClr>
+              </a:solidFill>
+              <a:latin typeface="+mn-lt"/>
+              <a:ea typeface="+mn-ea"/>
+              <a:cs typeface="+mn-cs"/>
+            </a:defRPr>
+          </a:pPr>
+          <a:endParaRPr lang="en-US"/>
+        </a:p>
+      </c:txPr>
+    </c:title>
+    <c:autoTitleDeleted val="0"/>
+    <c:plotArea>
+      <c:layout/>
+      <c:barChart>
+        <c:barDir val="col"/>
+        <c:grouping val="clustered"/>
+        <c:varyColors val="0"/>
+        <c:ser>
+          <c:idx val="0"/>
+          <c:order val="0"/>
+          <c:tx>
+            <c:strRef>
+              <c:f>Sheet1!$B$1</c:f>
+              <c:strCache>
+                <c:ptCount val="1"/>
+                <c:pt idx="0">
+                  <c:v>Story Points</c:v>
+                </c:pt>
+              </c:strCache>
+            </c:strRef>
+          </c:tx>
+          <c:spPr>
+            <a:solidFill>
+              <a:schemeClr val="accent1"/>
+            </a:solidFill>
+            <a:ln>
+              <a:noFill/>
+            </a:ln>
+            <a:effectLst/>
+          </c:spPr>
+          <c:invertIfNegative val="0"/>
+          <c:cat>
+            <c:strRef>
+              <c:f>Sheet1!$A$2</c:f>
+              <c:strCache>
+                <c:ptCount val="1"/>
+                <c:pt idx="0">
+                  <c:v>Sprint 2</c:v>
+                </c:pt>
+              </c:strCache>
+            </c:strRef>
+          </c:cat>
+          <c:val>
+            <c:numRef>
+              <c:f>Sheet1!$B$2</c:f>
+              <c:numCache>
+                <c:formatCode>General</c:formatCode>
+                <c:ptCount val="1"/>
+                <c:pt idx="0">
+                  <c:v>85</c:v>
+                </c:pt>
+              </c:numCache>
+            </c:numRef>
+          </c:val>
+          <c:extLst>
+            <c:ext xmlns:c16="http://schemas.microsoft.com/office/drawing/2014/chart" uri="{C3380CC4-5D6E-409C-BE32-E72D297353CC}">
+              <c16:uniqueId val="{00000000-D514-0647-BF7D-34086CD33902}"/>
+            </c:ext>
+          </c:extLst>
+        </c:ser>
+        <c:ser>
+          <c:idx val="1"/>
+          <c:order val="1"/>
+          <c:tx>
+            <c:strRef>
+              <c:f>Sheet1!$C$1</c:f>
+              <c:strCache>
+                <c:ptCount val="1"/>
+                <c:pt idx="0">
+                  <c:v>Story Points Completed</c:v>
+                </c:pt>
+              </c:strCache>
+            </c:strRef>
+          </c:tx>
+          <c:spPr>
+            <a:solidFill>
+              <a:schemeClr val="accent2"/>
+            </a:solidFill>
+            <a:ln>
+              <a:noFill/>
+            </a:ln>
+            <a:effectLst/>
+          </c:spPr>
+          <c:invertIfNegative val="0"/>
+          <c:cat>
+            <c:strRef>
+              <c:f>Sheet1!$A$2</c:f>
+              <c:strCache>
+                <c:ptCount val="1"/>
+                <c:pt idx="0">
+                  <c:v>Sprint 2</c:v>
+                </c:pt>
+              </c:strCache>
+            </c:strRef>
+          </c:cat>
+          <c:val>
+            <c:numRef>
+              <c:f>Sheet1!$C$2</c:f>
+              <c:numCache>
+                <c:formatCode>General</c:formatCode>
+                <c:ptCount val="1"/>
+                <c:pt idx="0">
+                  <c:v>84</c:v>
+                </c:pt>
+              </c:numCache>
+            </c:numRef>
+          </c:val>
+          <c:extLst>
+            <c:ext xmlns:c16="http://schemas.microsoft.com/office/drawing/2014/chart" uri="{C3380CC4-5D6E-409C-BE32-E72D297353CC}">
+              <c16:uniqueId val="{00000001-D514-0647-BF7D-34086CD33902}"/>
+            </c:ext>
+          </c:extLst>
+        </c:ser>
+        <c:dLbls>
+          <c:showLegendKey val="0"/>
+          <c:showVal val="0"/>
+          <c:showCatName val="0"/>
+          <c:showSerName val="0"/>
+          <c:showPercent val="0"/>
+          <c:showBubbleSize val="0"/>
+        </c:dLbls>
+        <c:gapWidth val="219"/>
+        <c:overlap val="-27"/>
+        <c:axId val="1560392960"/>
+        <c:axId val="1604904608"/>
+      </c:barChart>
+      <c:catAx>
+        <c:axId val="1560392960"/>
+        <c:scaling>
+          <c:orientation val="minMax"/>
+        </c:scaling>
+        <c:delete val="0"/>
+        <c:axPos val="b"/>
+        <c:numFmt formatCode="General" sourceLinked="1"/>
+        <c:majorTickMark val="none"/>
+        <c:minorTickMark val="none"/>
+        <c:tickLblPos val="nextTo"/>
+        <c:spPr>
+          <a:noFill/>
+          <a:ln w="9525" cap="flat" cmpd="sng" algn="ctr">
+            <a:solidFill>
+              <a:schemeClr val="tx1">
+                <a:lumMod val="15000"/>
+                <a:lumOff val="85000"/>
+              </a:schemeClr>
+            </a:solidFill>
+            <a:round/>
+          </a:ln>
+          <a:effectLst/>
+        </c:spPr>
+        <c:txPr>
+          <a:bodyPr rot="-60000000" spcFirstLastPara="1" vertOverflow="ellipsis" vert="horz" wrap="square" anchor="ctr" anchorCtr="1"/>
+          <a:lstStyle/>
+          <a:p>
+            <a:pPr>
+              <a:defRPr sz="1197" b="0" i="0" u="none" strike="noStrike" kern="1200" baseline="0">
+                <a:solidFill>
+                  <a:schemeClr val="tx1">
+                    <a:lumMod val="65000"/>
+                    <a:lumOff val="35000"/>
+                  </a:schemeClr>
+                </a:solidFill>
+                <a:latin typeface="+mn-lt"/>
+                <a:ea typeface="+mn-ea"/>
+                <a:cs typeface="+mn-cs"/>
+              </a:defRPr>
+            </a:pPr>
+            <a:endParaRPr lang="en-US"/>
+          </a:p>
+        </c:txPr>
+        <c:crossAx val="1604904608"/>
+        <c:crosses val="autoZero"/>
+        <c:auto val="1"/>
+        <c:lblAlgn val="ctr"/>
+        <c:lblOffset val="100"/>
+        <c:noMultiLvlLbl val="0"/>
+      </c:catAx>
+      <c:valAx>
+        <c:axId val="1604904608"/>
+        <c:scaling>
+          <c:orientation val="minMax"/>
+        </c:scaling>
+        <c:delete val="0"/>
+        <c:axPos val="l"/>
+        <c:majorGridlines>
+          <c:spPr>
+            <a:ln w="9525" cap="flat" cmpd="sng" algn="ctr">
+              <a:solidFill>
+                <a:schemeClr val="tx1">
+                  <a:lumMod val="15000"/>
+                  <a:lumOff val="85000"/>
+                </a:schemeClr>
+              </a:solidFill>
+              <a:round/>
+            </a:ln>
+            <a:effectLst/>
+          </c:spPr>
+        </c:majorGridlines>
+        <c:numFmt formatCode="General" sourceLinked="1"/>
+        <c:majorTickMark val="none"/>
+        <c:minorTickMark val="none"/>
+        <c:tickLblPos val="nextTo"/>
+        <c:spPr>
+          <a:noFill/>
+          <a:ln>
+            <a:noFill/>
+          </a:ln>
+          <a:effectLst/>
+        </c:spPr>
+        <c:txPr>
+          <a:bodyPr rot="-60000000" spcFirstLastPara="1" vertOverflow="ellipsis" vert="horz" wrap="square" anchor="ctr" anchorCtr="1"/>
+          <a:lstStyle/>
+          <a:p>
+            <a:pPr>
+              <a:defRPr sz="1197" b="0" i="0" u="none" strike="noStrike" kern="1200" baseline="0">
+                <a:solidFill>
+                  <a:schemeClr val="tx1">
+                    <a:lumMod val="65000"/>
+                    <a:lumOff val="35000"/>
+                  </a:schemeClr>
+                </a:solidFill>
+                <a:latin typeface="+mn-lt"/>
+                <a:ea typeface="+mn-ea"/>
+                <a:cs typeface="+mn-cs"/>
+              </a:defRPr>
+            </a:pPr>
+            <a:endParaRPr lang="en-US"/>
+          </a:p>
+        </c:txPr>
+        <c:crossAx val="1560392960"/>
+        <c:crosses val="autoZero"/>
+        <c:crossBetween val="between"/>
+      </c:valAx>
+      <c:spPr>
+        <a:noFill/>
+        <a:ln>
+          <a:noFill/>
+        </a:ln>
+        <a:effectLst/>
+      </c:spPr>
+    </c:plotArea>
+    <c:legend>
+      <c:legendPos val="b"/>
+      <c:overlay val="0"/>
+      <c:spPr>
+        <a:noFill/>
+        <a:ln>
+          <a:noFill/>
+        </a:ln>
+        <a:effectLst/>
+      </c:spPr>
+      <c:txPr>
+        <a:bodyPr rot="0" spcFirstLastPara="1" vertOverflow="ellipsis" vert="horz" wrap="square" anchor="ctr" anchorCtr="1"/>
+        <a:lstStyle/>
+        <a:p>
+          <a:pPr>
+            <a:defRPr sz="1197" b="0" i="0" u="none" strike="noStrike" kern="1200" baseline="0">
+              <a:solidFill>
+                <a:schemeClr val="tx1">
+                  <a:lumMod val="65000"/>
+                  <a:lumOff val="35000"/>
+                </a:schemeClr>
+              </a:solidFill>
+              <a:latin typeface="+mn-lt"/>
+              <a:ea typeface="+mn-ea"/>
+              <a:cs typeface="+mn-cs"/>
+            </a:defRPr>
+          </a:pPr>
+          <a:endParaRPr lang="en-US"/>
+        </a:p>
+      </c:txPr>
+    </c:legend>
+    <c:plotVisOnly val="1"/>
+    <c:dispBlanksAs val="gap"/>
+    <c:extLst>
+      <c:ext xmlns:c16r3="http://schemas.microsoft.com/office/drawing/2017/03/chart" uri="{56B9EC1D-385E-4148-901F-78D8002777C0}">
+        <c16r3:dataDisplayOptions16>
+          <c16r3:dispNaAsBlank val="1"/>
+        </c16r3:dataDisplayOptions16>
+      </c:ext>
+    </c:extLst>
+    <c:showDLblsOverMax val="0"/>
+  </c:chart>
+  <c:spPr>
+    <a:noFill/>
+    <a:ln>
+      <a:noFill/>
+    </a:ln>
+    <a:effectLst/>
+  </c:spPr>
+  <c:txPr>
+    <a:bodyPr/>
+    <a:lstStyle/>
+    <a:p>
+      <a:pPr>
+        <a:defRPr/>
+      </a:pPr>
+      <a:endParaRPr lang="en-US"/>
+    </a:p>
+  </c:txPr>
+  <c:externalData r:id="rId3">
+    <c:autoUpdate val="0"/>
+  </c:externalData>
+</c:chartSpace>
+</file>
+
+<file path=ppt/charts/chart7.xml><?xml version="1.0" encoding="utf-8"?>
+<c:chartSpace xmlns:c="http://schemas.openxmlformats.org/drawingml/2006/chart" xmlns:a="http://schemas.openxmlformats.org/drawingml/2006/main" xmlns:r="http://schemas.openxmlformats.org/officeDocument/2006/relationships" xmlns:c16r2="http://schemas.microsoft.com/office/drawing/2015/06/chart">
+  <c:date1904 val="0"/>
+  <c:lang val="en-US"/>
+  <c:roundedCorners val="0"/>
+  <mc:AlternateContent xmlns:mc="http://schemas.openxmlformats.org/markup-compatibility/2006">
+    <mc:Choice xmlns:c14="http://schemas.microsoft.com/office/drawing/2007/8/2/chart" Requires="c14">
+      <c14:style val="102"/>
+    </mc:Choice>
+    <mc:Fallback>
+      <c:style val="2"/>
+    </mc:Fallback>
+  </mc:AlternateContent>
+  <c:chart>
+    <c:title>
+      <c:overlay val="0"/>
+      <c:spPr>
+        <a:noFill/>
+        <a:ln>
+          <a:noFill/>
+        </a:ln>
+        <a:effectLst/>
+      </c:spPr>
+      <c:txPr>
+        <a:bodyPr rot="0" spcFirstLastPara="1" vertOverflow="ellipsis" vert="horz" wrap="square" anchor="ctr" anchorCtr="1"/>
+        <a:lstStyle/>
+        <a:p>
+          <a:pPr>
+            <a:defRPr sz="1862" b="0" i="0" u="none" strike="noStrike" kern="1200" spc="0" baseline="0">
+              <a:solidFill>
+                <a:schemeClr val="tx1">
+                  <a:lumMod val="65000"/>
+                  <a:lumOff val="35000"/>
+                </a:schemeClr>
+              </a:solidFill>
+              <a:latin typeface="+mn-lt"/>
+              <a:ea typeface="+mn-ea"/>
+              <a:cs typeface="+mn-cs"/>
+            </a:defRPr>
+          </a:pPr>
+          <a:endParaRPr lang="en-US"/>
+        </a:p>
+      </c:txPr>
+    </c:title>
+    <c:autoTitleDeleted val="0"/>
+    <c:plotArea>
+      <c:layout/>
+      <c:pieChart>
+        <c:varyColors val="1"/>
+        <c:ser>
+          <c:idx val="0"/>
+          <c:order val="0"/>
+          <c:tx>
+            <c:strRef>
+              <c:f>Sheet1!$B$1</c:f>
+              <c:strCache>
+                <c:ptCount val="1"/>
+                <c:pt idx="0">
+                  <c:v>Total Story Points</c:v>
+                </c:pt>
+              </c:strCache>
+            </c:strRef>
+          </c:tx>
+          <c:dPt>
+            <c:idx val="0"/>
+            <c:bubble3D val="0"/>
+            <c:spPr>
+              <a:solidFill>
+                <a:schemeClr val="accent1"/>
+              </a:solidFill>
+              <a:ln w="19050">
+                <a:solidFill>
+                  <a:schemeClr val="lt1"/>
+                </a:solidFill>
+              </a:ln>
+              <a:effectLst/>
+            </c:spPr>
+            <c:extLst>
+              <c:ext xmlns:c16="http://schemas.microsoft.com/office/drawing/2014/chart" uri="{C3380CC4-5D6E-409C-BE32-E72D297353CC}">
+                <c16:uniqueId val="{00000001-9A7D-9544-ABD0-595152BED3F2}"/>
+              </c:ext>
+            </c:extLst>
+          </c:dPt>
+          <c:dPt>
+            <c:idx val="1"/>
+            <c:bubble3D val="0"/>
+            <c:spPr>
+              <a:solidFill>
+                <a:schemeClr val="accent2"/>
+              </a:solidFill>
+              <a:ln w="19050">
+                <a:solidFill>
+                  <a:schemeClr val="lt1"/>
+                </a:solidFill>
+              </a:ln>
+              <a:effectLst/>
+            </c:spPr>
+            <c:extLst>
+              <c:ext xmlns:c16="http://schemas.microsoft.com/office/drawing/2014/chart" uri="{C3380CC4-5D6E-409C-BE32-E72D297353CC}">
+                <c16:uniqueId val="{00000003-9A7D-9544-ABD0-595152BED3F2}"/>
+              </c:ext>
+            </c:extLst>
+          </c:dPt>
+          <c:cat>
+            <c:strRef>
+              <c:f>Sheet1!$A$2:$A$3</c:f>
+              <c:strCache>
+                <c:ptCount val="2"/>
+                <c:pt idx="0">
+                  <c:v>Completed- Catalyst 2</c:v>
+                </c:pt>
+                <c:pt idx="1">
+                  <c:v>Incomplete - Catalyst 2</c:v>
+                </c:pt>
+              </c:strCache>
+            </c:strRef>
+          </c:cat>
+          <c:val>
+            <c:numRef>
+              <c:f>Sheet1!$B$2:$B$3</c:f>
+              <c:numCache>
+                <c:formatCode>General</c:formatCode>
+                <c:ptCount val="2"/>
+                <c:pt idx="0">
+                  <c:v>84</c:v>
+                </c:pt>
+                <c:pt idx="1">
+                  <c:v>1</c:v>
+                </c:pt>
+              </c:numCache>
+            </c:numRef>
+          </c:val>
+          <c:extLst>
+            <c:ext xmlns:c16="http://schemas.microsoft.com/office/drawing/2014/chart" uri="{C3380CC4-5D6E-409C-BE32-E72D297353CC}">
+              <c16:uniqueId val="{00000000-8A3E-4B43-947F-23E171FF71E0}"/>
+            </c:ext>
+          </c:extLst>
+        </c:ser>
+        <c:dLbls>
+          <c:showLegendKey val="0"/>
+          <c:showVal val="0"/>
+          <c:showCatName val="0"/>
+          <c:showSerName val="0"/>
+          <c:showPercent val="0"/>
+          <c:showBubbleSize val="0"/>
+          <c:showLeaderLines val="1"/>
+        </c:dLbls>
+        <c:firstSliceAng val="0"/>
+      </c:pieChart>
+      <c:spPr>
+        <a:noFill/>
+        <a:ln>
+          <a:noFill/>
+        </a:ln>
+        <a:effectLst/>
+      </c:spPr>
+    </c:plotArea>
+    <c:legend>
+      <c:legendPos val="b"/>
+      <c:overlay val="0"/>
+      <c:spPr>
+        <a:noFill/>
+        <a:ln>
+          <a:noFill/>
+        </a:ln>
+        <a:effectLst/>
+      </c:spPr>
+      <c:txPr>
+        <a:bodyPr rot="0" spcFirstLastPara="1" vertOverflow="ellipsis" vert="horz" wrap="square" anchor="ctr" anchorCtr="1"/>
+        <a:lstStyle/>
+        <a:p>
+          <a:pPr>
+            <a:defRPr sz="1197" b="0" i="0" u="none" strike="noStrike" kern="1200" baseline="0">
+              <a:solidFill>
+                <a:schemeClr val="tx1">
+                  <a:lumMod val="65000"/>
+                  <a:lumOff val="35000"/>
+                </a:schemeClr>
+              </a:solidFill>
+              <a:latin typeface="+mn-lt"/>
+              <a:ea typeface="+mn-ea"/>
+              <a:cs typeface="+mn-cs"/>
+            </a:defRPr>
+          </a:pPr>
+          <a:endParaRPr lang="en-US"/>
+        </a:p>
+      </c:txPr>
+    </c:legend>
+    <c:plotVisOnly val="1"/>
+    <c:dispBlanksAs val="gap"/>
+    <c:extLst>
+      <c:ext xmlns:c16r3="http://schemas.microsoft.com/office/drawing/2017/03/chart" uri="{56B9EC1D-385E-4148-901F-78D8002777C0}">
+        <c16r3:dataDisplayOptions16>
+          <c16r3:dispNaAsBlank val="1"/>
+        </c16r3:dataDisplayOptions16>
+      </c:ext>
+    </c:extLst>
+    <c:showDLblsOverMax val="0"/>
+  </c:chart>
+  <c:spPr>
+    <a:noFill/>
+    <a:ln>
+      <a:noFill/>
+    </a:ln>
+    <a:effectLst/>
+  </c:spPr>
+  <c:txPr>
+    <a:bodyPr/>
+    <a:lstStyle/>
+    <a:p>
+      <a:pPr>
+        <a:defRPr/>
+      </a:pPr>
+      <a:endParaRPr lang="en-US"/>
+    </a:p>
+  </c:txPr>
+  <c:externalData r:id="rId3">
+    <c:autoUpdate val="0"/>
+  </c:externalData>
+</c:chartSpace>
+</file>
+
+<file path=ppt/charts/chart8.xml><?xml version="1.0" encoding="utf-8"?>
+<c:chartSpace xmlns:c="http://schemas.openxmlformats.org/drawingml/2006/chart" xmlns:a="http://schemas.openxmlformats.org/drawingml/2006/main" xmlns:r="http://schemas.openxmlformats.org/officeDocument/2006/relationships" xmlns:c16r2="http://schemas.microsoft.com/office/drawing/2015/06/chart">
+  <c:date1904 val="0"/>
+  <c:lang val="en-US"/>
+  <c:roundedCorners val="0"/>
+  <mc:AlternateContent xmlns:mc="http://schemas.openxmlformats.org/markup-compatibility/2006">
+    <mc:Choice xmlns:c14="http://schemas.microsoft.com/office/drawing/2007/8/2/chart" Requires="c14">
+      <c14:style val="102"/>
+    </mc:Choice>
+    <mc:Fallback>
+      <c:style val="2"/>
+    </mc:Fallback>
+  </mc:AlternateContent>
+  <c:chart>
+    <c:title>
+      <c:tx>
+        <c:rich>
+          <a:bodyPr rot="0" spcFirstLastPara="1" vertOverflow="ellipsis" vert="horz" wrap="square" anchor="ctr" anchorCtr="1"/>
+          <a:lstStyle/>
+          <a:p>
+            <a:pPr>
+              <a:defRPr sz="1400" b="0" i="0" u="none" strike="noStrike" kern="1200" spc="0" baseline="0">
+                <a:solidFill>
+                  <a:schemeClr val="tx1">
+                    <a:lumMod val="65000"/>
+                    <a:lumOff val="35000"/>
+                  </a:schemeClr>
+                </a:solidFill>
+                <a:latin typeface="+mn-lt"/>
+                <a:ea typeface="+mn-ea"/>
+                <a:cs typeface="+mn-cs"/>
+              </a:defRPr>
+            </a:pPr>
+            <a:r>
+              <a:rPr lang="en-US"/>
+              <a:t>Catalyst 2:  Burn Down Chart</a:t>
+            </a:r>
+          </a:p>
+        </c:rich>
+      </c:tx>
+      <c:overlay val="0"/>
+      <c:spPr>
+        <a:noFill/>
+        <a:ln>
+          <a:noFill/>
+        </a:ln>
+        <a:effectLst/>
+      </c:spPr>
+      <c:txPr>
+        <a:bodyPr rot="0" spcFirstLastPara="1" vertOverflow="ellipsis" vert="horz" wrap="square" anchor="ctr" anchorCtr="1"/>
+        <a:lstStyle/>
+        <a:p>
+          <a:pPr>
+            <a:defRPr sz="1400" b="0" i="0" u="none" strike="noStrike" kern="1200" spc="0" baseline="0">
+              <a:solidFill>
+                <a:schemeClr val="tx1">
+                  <a:lumMod val="65000"/>
+                  <a:lumOff val="35000"/>
+                </a:schemeClr>
+              </a:solidFill>
+              <a:latin typeface="+mn-lt"/>
+              <a:ea typeface="+mn-ea"/>
+              <a:cs typeface="+mn-cs"/>
+            </a:defRPr>
+          </a:pPr>
+          <a:endParaRPr lang="en-US"/>
+        </a:p>
+      </c:txPr>
+    </c:title>
+    <c:autoTitleDeleted val="0"/>
+    <c:plotArea>
+      <c:layout/>
+      <c:lineChart>
+        <c:grouping val="standard"/>
+        <c:varyColors val="0"/>
+        <c:ser>
+          <c:idx val="0"/>
+          <c:order val="0"/>
+          <c:tx>
+            <c:strRef>
+              <c:f>'Sprint 1a'!$E$1</c:f>
+              <c:strCache>
+                <c:ptCount val="1"/>
+                <c:pt idx="0">
+                  <c:v>Work Scope</c:v>
+                </c:pt>
+              </c:strCache>
+            </c:strRef>
+          </c:tx>
+          <c:spPr>
+            <a:ln w="28575" cap="rnd">
+              <a:solidFill>
+                <a:schemeClr val="accent1"/>
+              </a:solidFill>
+              <a:round/>
+            </a:ln>
+            <a:effectLst/>
+          </c:spPr>
+          <c:marker>
+            <c:symbol val="none"/>
+          </c:marker>
+          <c:cat>
+            <c:numRef>
+              <c:f>'Sprint 1a'!$A$2:$A$12</c:f>
+              <c:numCache>
+                <c:formatCode>m/d/yy</c:formatCode>
+                <c:ptCount val="11"/>
+                <c:pt idx="0">
+                  <c:v>45007</c:v>
+                </c:pt>
+                <c:pt idx="1">
+                  <c:v>45009</c:v>
+                </c:pt>
+                <c:pt idx="2">
+                  <c:v>45010</c:v>
+                </c:pt>
+                <c:pt idx="3">
+                  <c:v>45012</c:v>
+                </c:pt>
+                <c:pt idx="4">
+                  <c:v>45026</c:v>
+                </c:pt>
+                <c:pt idx="5">
+                  <c:v>45030</c:v>
+                </c:pt>
+                <c:pt idx="6">
+                  <c:v>45033</c:v>
+                </c:pt>
+                <c:pt idx="7">
+                  <c:v>45036</c:v>
+                </c:pt>
+                <c:pt idx="8">
+                  <c:v>45037</c:v>
+                </c:pt>
+                <c:pt idx="9">
+                  <c:v>45041</c:v>
+                </c:pt>
+                <c:pt idx="10">
+                  <c:v>45043</c:v>
+                </c:pt>
+              </c:numCache>
+            </c:numRef>
+          </c:cat>
+          <c:val>
+            <c:numRef>
+              <c:f>'Sprint 1a'!$E$2:$E$12</c:f>
+              <c:numCache>
+                <c:formatCode>General</c:formatCode>
+                <c:ptCount val="11"/>
+                <c:pt idx="0">
+                  <c:v>85</c:v>
+                </c:pt>
+                <c:pt idx="1">
+                  <c:v>85</c:v>
+                </c:pt>
+                <c:pt idx="2">
+                  <c:v>85</c:v>
+                </c:pt>
+                <c:pt idx="3">
+                  <c:v>85</c:v>
+                </c:pt>
+                <c:pt idx="4">
+                  <c:v>85</c:v>
+                </c:pt>
+                <c:pt idx="5">
+                  <c:v>85</c:v>
+                </c:pt>
+                <c:pt idx="6">
+                  <c:v>85</c:v>
+                </c:pt>
+                <c:pt idx="7">
+                  <c:v>85</c:v>
+                </c:pt>
+                <c:pt idx="8">
+                  <c:v>85</c:v>
+                </c:pt>
+                <c:pt idx="9">
+                  <c:v>85</c:v>
+                </c:pt>
+                <c:pt idx="10">
+                  <c:v>85</c:v>
+                </c:pt>
+              </c:numCache>
+            </c:numRef>
+          </c:val>
+          <c:smooth val="0"/>
+          <c:extLst>
+            <c:ext xmlns:c16="http://schemas.microsoft.com/office/drawing/2014/chart" uri="{C3380CC4-5D6E-409C-BE32-E72D297353CC}">
+              <c16:uniqueId val="{00000000-ACE8-764A-9186-D15F8C93548B}"/>
+            </c:ext>
+          </c:extLst>
+        </c:ser>
+        <c:ser>
+          <c:idx val="1"/>
+          <c:order val="1"/>
+          <c:tx>
+            <c:strRef>
+              <c:f>'Sprint 1a'!$F$1</c:f>
+              <c:strCache>
+                <c:ptCount val="1"/>
+                <c:pt idx="0">
+                  <c:v>Remaining Work</c:v>
+                </c:pt>
+              </c:strCache>
+            </c:strRef>
+          </c:tx>
+          <c:spPr>
+            <a:ln w="28575" cap="rnd">
+              <a:solidFill>
+                <a:schemeClr val="accent2"/>
+              </a:solidFill>
+              <a:round/>
+            </a:ln>
+            <a:effectLst/>
+          </c:spPr>
+          <c:marker>
+            <c:symbol val="none"/>
+          </c:marker>
+          <c:cat>
+            <c:numRef>
+              <c:f>'Sprint 1a'!$A$2:$A$12</c:f>
+              <c:numCache>
+                <c:formatCode>m/d/yy</c:formatCode>
+                <c:ptCount val="11"/>
+                <c:pt idx="0">
+                  <c:v>45007</c:v>
+                </c:pt>
+                <c:pt idx="1">
+                  <c:v>45009</c:v>
+                </c:pt>
+                <c:pt idx="2">
+                  <c:v>45010</c:v>
+                </c:pt>
+                <c:pt idx="3">
+                  <c:v>45012</c:v>
+                </c:pt>
+                <c:pt idx="4">
+                  <c:v>45026</c:v>
+                </c:pt>
+                <c:pt idx="5">
+                  <c:v>45030</c:v>
+                </c:pt>
+                <c:pt idx="6">
+                  <c:v>45033</c:v>
+                </c:pt>
+                <c:pt idx="7">
+                  <c:v>45036</c:v>
+                </c:pt>
+                <c:pt idx="8">
+                  <c:v>45037</c:v>
+                </c:pt>
+                <c:pt idx="9">
+                  <c:v>45041</c:v>
+                </c:pt>
+                <c:pt idx="10">
+                  <c:v>45043</c:v>
+                </c:pt>
+              </c:numCache>
+            </c:numRef>
+          </c:cat>
+          <c:val>
+            <c:numRef>
+              <c:f>'Sprint 1a'!$F$2:$F$12</c:f>
+              <c:numCache>
+                <c:formatCode>General</c:formatCode>
+                <c:ptCount val="11"/>
+                <c:pt idx="0">
+                  <c:v>85</c:v>
+                </c:pt>
+                <c:pt idx="1">
+                  <c:v>80</c:v>
+                </c:pt>
+                <c:pt idx="2">
+                  <c:v>78</c:v>
+                </c:pt>
+                <c:pt idx="3">
+                  <c:v>73</c:v>
+                </c:pt>
+                <c:pt idx="4">
+                  <c:v>68</c:v>
+                </c:pt>
+                <c:pt idx="5">
+                  <c:v>55</c:v>
+                </c:pt>
+                <c:pt idx="6">
+                  <c:v>50</c:v>
+                </c:pt>
+                <c:pt idx="7">
+                  <c:v>25</c:v>
+                </c:pt>
+                <c:pt idx="8">
+                  <c:v>24</c:v>
+                </c:pt>
+                <c:pt idx="9">
+                  <c:v>12</c:v>
+                </c:pt>
+                <c:pt idx="10">
+                  <c:v>1</c:v>
+                </c:pt>
+              </c:numCache>
+            </c:numRef>
+          </c:val>
+          <c:smooth val="0"/>
+          <c:extLst>
+            <c:ext xmlns:c16="http://schemas.microsoft.com/office/drawing/2014/chart" uri="{C3380CC4-5D6E-409C-BE32-E72D297353CC}">
+              <c16:uniqueId val="{00000001-ACE8-764A-9186-D15F8C93548B}"/>
+            </c:ext>
+          </c:extLst>
+        </c:ser>
+        <c:dLbls>
+          <c:showLegendKey val="0"/>
+          <c:showVal val="0"/>
+          <c:showCatName val="0"/>
+          <c:showSerName val="0"/>
+          <c:showPercent val="0"/>
+          <c:showBubbleSize val="0"/>
+        </c:dLbls>
+        <c:smooth val="0"/>
+        <c:axId val="2103334048"/>
+        <c:axId val="2103129088"/>
+      </c:lineChart>
+      <c:dateAx>
+        <c:axId val="2103334048"/>
+        <c:scaling>
+          <c:orientation val="minMax"/>
+        </c:scaling>
+        <c:delete val="0"/>
+        <c:axPos val="b"/>
+        <c:title>
+          <c:tx>
+            <c:rich>
+              <a:bodyPr rot="0" spcFirstLastPara="1" vertOverflow="ellipsis" vert="horz" wrap="square" anchor="ctr" anchorCtr="1"/>
+              <a:lstStyle/>
+              <a:p>
+                <a:pPr>
+                  <a:defRPr sz="1000" b="0" i="0" u="none" strike="noStrike" kern="1200" baseline="0">
+                    <a:solidFill>
+                      <a:schemeClr val="tx1">
+                        <a:lumMod val="65000"/>
+                        <a:lumOff val="35000"/>
+                      </a:schemeClr>
+                    </a:solidFill>
+                    <a:latin typeface="+mn-lt"/>
+                    <a:ea typeface="+mn-ea"/>
+                    <a:cs typeface="+mn-cs"/>
+                  </a:defRPr>
+                </a:pPr>
+                <a:r>
+                  <a:rPr lang="en-US"/>
+                  <a:t>Date</a:t>
+                </a:r>
+              </a:p>
+            </c:rich>
+          </c:tx>
+          <c:overlay val="0"/>
+          <c:spPr>
+            <a:noFill/>
+            <a:ln>
+              <a:noFill/>
+            </a:ln>
+            <a:effectLst/>
+          </c:spPr>
+          <c:txPr>
+            <a:bodyPr rot="0" spcFirstLastPara="1" vertOverflow="ellipsis" vert="horz" wrap="square" anchor="ctr" anchorCtr="1"/>
+            <a:lstStyle/>
+            <a:p>
+              <a:pPr>
+                <a:defRPr sz="1000" b="0" i="0" u="none" strike="noStrike" kern="1200" baseline="0">
+                  <a:solidFill>
+                    <a:schemeClr val="tx1">
+                      <a:lumMod val="65000"/>
+                      <a:lumOff val="35000"/>
+                    </a:schemeClr>
+                  </a:solidFill>
+                  <a:latin typeface="+mn-lt"/>
+                  <a:ea typeface="+mn-ea"/>
+                  <a:cs typeface="+mn-cs"/>
+                </a:defRPr>
+              </a:pPr>
+              <a:endParaRPr lang="en-US"/>
+            </a:p>
+          </c:txPr>
+        </c:title>
+        <c:numFmt formatCode="m/d/yy" sourceLinked="1"/>
+        <c:majorTickMark val="out"/>
+        <c:minorTickMark val="none"/>
+        <c:tickLblPos val="nextTo"/>
+        <c:spPr>
+          <a:noFill/>
+          <a:ln w="9525" cap="flat" cmpd="sng" algn="ctr">
+            <a:solidFill>
+              <a:schemeClr val="tx1">
+                <a:lumMod val="15000"/>
+                <a:lumOff val="85000"/>
+              </a:schemeClr>
+            </a:solidFill>
+            <a:round/>
+          </a:ln>
+          <a:effectLst/>
+        </c:spPr>
+        <c:txPr>
+          <a:bodyPr rot="-60000000" spcFirstLastPara="1" vertOverflow="ellipsis" vert="horz" wrap="square" anchor="ctr" anchorCtr="1"/>
+          <a:lstStyle/>
+          <a:p>
+            <a:pPr>
+              <a:defRPr sz="900" b="0" i="0" u="none" strike="noStrike" kern="1200" baseline="0">
+                <a:solidFill>
+                  <a:schemeClr val="tx1">
+                    <a:lumMod val="65000"/>
+                    <a:lumOff val="35000"/>
+                  </a:schemeClr>
+                </a:solidFill>
+                <a:latin typeface="+mn-lt"/>
+                <a:ea typeface="+mn-ea"/>
+                <a:cs typeface="+mn-cs"/>
+              </a:defRPr>
+            </a:pPr>
+            <a:endParaRPr lang="en-US"/>
+          </a:p>
+        </c:txPr>
+        <c:crossAx val="2103129088"/>
+        <c:crosses val="autoZero"/>
+        <c:auto val="1"/>
+        <c:lblOffset val="100"/>
+        <c:baseTimeUnit val="days"/>
+      </c:dateAx>
+      <c:valAx>
+        <c:axId val="2103129088"/>
+        <c:scaling>
+          <c:orientation val="minMax"/>
+        </c:scaling>
+        <c:delete val="0"/>
+        <c:axPos val="l"/>
+        <c:majorGridlines>
+          <c:spPr>
+            <a:ln w="9525" cap="flat" cmpd="sng" algn="ctr">
+              <a:solidFill>
+                <a:schemeClr val="tx1">
+                  <a:lumMod val="15000"/>
+                  <a:lumOff val="85000"/>
+                </a:schemeClr>
+              </a:solidFill>
+              <a:round/>
+            </a:ln>
+            <a:effectLst/>
+          </c:spPr>
+        </c:majorGridlines>
+        <c:title>
+          <c:tx>
+            <c:rich>
+              <a:bodyPr rot="-5400000" spcFirstLastPara="1" vertOverflow="ellipsis" vert="horz" wrap="square" anchor="ctr" anchorCtr="1"/>
+              <a:lstStyle/>
+              <a:p>
+                <a:pPr>
+                  <a:defRPr sz="1000" b="0" i="0" u="none" strike="noStrike" kern="1200" baseline="0">
+                    <a:solidFill>
+                      <a:schemeClr val="tx1">
+                        <a:lumMod val="65000"/>
+                        <a:lumOff val="35000"/>
+                      </a:schemeClr>
+                    </a:solidFill>
+                    <a:latin typeface="+mn-lt"/>
+                    <a:ea typeface="+mn-ea"/>
+                    <a:cs typeface="+mn-cs"/>
+                  </a:defRPr>
+                </a:pPr>
+                <a:r>
+                  <a:rPr lang="en-US"/>
+                  <a:t>Story Point</a:t>
+                </a:r>
+              </a:p>
+            </c:rich>
+          </c:tx>
+          <c:overlay val="0"/>
+          <c:spPr>
+            <a:noFill/>
+            <a:ln>
+              <a:noFill/>
+            </a:ln>
+            <a:effectLst/>
+          </c:spPr>
+          <c:txPr>
+            <a:bodyPr rot="-5400000" spcFirstLastPara="1" vertOverflow="ellipsis" vert="horz" wrap="square" anchor="ctr" anchorCtr="1"/>
+            <a:lstStyle/>
+            <a:p>
+              <a:pPr>
+                <a:defRPr sz="1000" b="0" i="0" u="none" strike="noStrike" kern="1200" baseline="0">
+                  <a:solidFill>
+                    <a:schemeClr val="tx1">
+                      <a:lumMod val="65000"/>
+                      <a:lumOff val="35000"/>
+                    </a:schemeClr>
+                  </a:solidFill>
+                  <a:latin typeface="+mn-lt"/>
+                  <a:ea typeface="+mn-ea"/>
+                  <a:cs typeface="+mn-cs"/>
+                </a:defRPr>
+              </a:pPr>
+              <a:endParaRPr lang="en-US"/>
+            </a:p>
+          </c:txPr>
+        </c:title>
+        <c:numFmt formatCode="General" sourceLinked="1"/>
+        <c:majorTickMark val="none"/>
+        <c:minorTickMark val="none"/>
+        <c:tickLblPos val="nextTo"/>
+        <c:spPr>
+          <a:noFill/>
+          <a:ln>
+            <a:noFill/>
+          </a:ln>
+          <a:effectLst/>
+        </c:spPr>
+        <c:txPr>
+          <a:bodyPr rot="-60000000" spcFirstLastPara="1" vertOverflow="ellipsis" vert="horz" wrap="square" anchor="ctr" anchorCtr="1"/>
+          <a:lstStyle/>
+          <a:p>
+            <a:pPr>
+              <a:defRPr sz="900" b="0" i="0" u="none" strike="noStrike" kern="1200" baseline="0">
+                <a:solidFill>
+                  <a:schemeClr val="tx1">
+                    <a:lumMod val="65000"/>
+                    <a:lumOff val="35000"/>
+                  </a:schemeClr>
+                </a:solidFill>
+                <a:latin typeface="+mn-lt"/>
+                <a:ea typeface="+mn-ea"/>
+                <a:cs typeface="+mn-cs"/>
+              </a:defRPr>
+            </a:pPr>
+            <a:endParaRPr lang="en-US"/>
+          </a:p>
+        </c:txPr>
+        <c:crossAx val="2103334048"/>
+        <c:crosses val="autoZero"/>
+        <c:crossBetween val="between"/>
+      </c:valAx>
+      <c:spPr>
+        <a:noFill/>
+        <a:ln>
+          <a:noFill/>
+        </a:ln>
+        <a:effectLst/>
+      </c:spPr>
+    </c:plotArea>
+    <c:legend>
+      <c:legendPos val="b"/>
+      <c:overlay val="0"/>
+      <c:spPr>
+        <a:noFill/>
+        <a:ln>
+          <a:noFill/>
+        </a:ln>
+        <a:effectLst/>
+      </c:spPr>
+      <c:txPr>
+        <a:bodyPr rot="0" spcFirstLastPara="1" vertOverflow="ellipsis" vert="horz" wrap="square" anchor="ctr" anchorCtr="1"/>
+        <a:lstStyle/>
+        <a:p>
+          <a:pPr>
+            <a:defRPr sz="900" b="0" i="0" u="none" strike="noStrike" kern="1200" baseline="0">
+              <a:solidFill>
+                <a:schemeClr val="tx1">
+                  <a:lumMod val="65000"/>
+                  <a:lumOff val="35000"/>
+                </a:schemeClr>
+              </a:solidFill>
+              <a:latin typeface="+mn-lt"/>
+              <a:ea typeface="+mn-ea"/>
+              <a:cs typeface="+mn-cs"/>
+            </a:defRPr>
+          </a:pPr>
+          <a:endParaRPr lang="en-US"/>
+        </a:p>
+      </c:txPr>
+    </c:legend>
+    <c:plotVisOnly val="1"/>
+    <c:dispBlanksAs val="gap"/>
+    <c:showDLblsOverMax val="0"/>
+  </c:chart>
+  <c:spPr>
+    <a:noFill/>
+    <a:ln>
+      <a:noFill/>
+    </a:ln>
+    <a:effectLst/>
+  </c:spPr>
+  <c:txPr>
+    <a:bodyPr/>
+    <a:lstStyle/>
+    <a:p>
+      <a:pPr>
+        <a:defRPr/>
+      </a:pPr>
+      <a:endParaRPr lang="en-US"/>
+    </a:p>
+  </c:txPr>
+  <c:externalData r:id="rId3">
+    <c:autoUpdate val="0"/>
+  </c:externalData>
+</c:chartSpace>
+</file>
+
+<file path=ppt/charts/chart9.xml><?xml version="1.0" encoding="utf-8"?>
+<c:chartSpace xmlns:c="http://schemas.openxmlformats.org/drawingml/2006/chart" xmlns:a="http://schemas.openxmlformats.org/drawingml/2006/main" xmlns:r="http://schemas.openxmlformats.org/officeDocument/2006/relationships" xmlns:c16r2="http://schemas.microsoft.com/office/drawing/2015/06/chart">
+  <c:date1904 val="0"/>
+  <c:lang val="en-US"/>
+  <c:roundedCorners val="0"/>
+  <mc:AlternateContent xmlns:mc="http://schemas.openxmlformats.org/markup-compatibility/2006">
+    <mc:Choice xmlns:c14="http://schemas.microsoft.com/office/drawing/2007/8/2/chart" Requires="c14">
+      <c14:style val="102"/>
+    </mc:Choice>
+    <mc:Fallback>
+      <c:style val="2"/>
+    </mc:Fallback>
+  </mc:AlternateContent>
+  <c:chart>
+    <c:title>
+      <c:tx>
+        <c:rich>
+          <a:bodyPr rot="0" spcFirstLastPara="1" vertOverflow="ellipsis" vert="horz" wrap="square" anchor="ctr" anchorCtr="1"/>
+          <a:lstStyle/>
+          <a:p>
+            <a:pPr>
+              <a:defRPr sz="1400" b="0" i="0" u="none" strike="noStrike" kern="1200" spc="0" baseline="0">
+                <a:solidFill>
+                  <a:schemeClr val="tx1">
+                    <a:lumMod val="65000"/>
+                    <a:lumOff val="35000"/>
+                  </a:schemeClr>
+                </a:solidFill>
+                <a:latin typeface="+mn-lt"/>
+                <a:ea typeface="+mn-ea"/>
+                <a:cs typeface="+mn-cs"/>
+              </a:defRPr>
+            </a:pPr>
+            <a:r>
+              <a:rPr lang="en-US"/>
+              <a:t>Catalyst</a:t>
+            </a:r>
+            <a:r>
+              <a:rPr lang="en-US" baseline="0"/>
+              <a:t> 2:  Burn Up Report</a:t>
+            </a:r>
+            <a:endParaRPr lang="en-US"/>
+          </a:p>
+        </c:rich>
+      </c:tx>
+      <c:overlay val="0"/>
+      <c:spPr>
+        <a:noFill/>
+        <a:ln>
+          <a:noFill/>
+        </a:ln>
+        <a:effectLst/>
+      </c:spPr>
+      <c:txPr>
+        <a:bodyPr rot="0" spcFirstLastPara="1" vertOverflow="ellipsis" vert="horz" wrap="square" anchor="ctr" anchorCtr="1"/>
+        <a:lstStyle/>
+        <a:p>
+          <a:pPr>
+            <a:defRPr sz="1400" b="0" i="0" u="none" strike="noStrike" kern="1200" spc="0" baseline="0">
+              <a:solidFill>
+                <a:schemeClr val="tx1">
+                  <a:lumMod val="65000"/>
+                  <a:lumOff val="35000"/>
+                </a:schemeClr>
+              </a:solidFill>
+              <a:latin typeface="+mn-lt"/>
+              <a:ea typeface="+mn-ea"/>
+              <a:cs typeface="+mn-cs"/>
+            </a:defRPr>
+          </a:pPr>
+          <a:endParaRPr lang="en-US"/>
+        </a:p>
+      </c:txPr>
+    </c:title>
+    <c:autoTitleDeleted val="0"/>
+    <c:plotArea>
+      <c:layout/>
+      <c:lineChart>
+        <c:grouping val="standard"/>
+        <c:varyColors val="0"/>
+        <c:ser>
+          <c:idx val="1"/>
+          <c:order val="0"/>
+          <c:tx>
+            <c:strRef>
+              <c:f>'Sprint 1a'!$C$1</c:f>
+              <c:strCache>
+                <c:ptCount val="1"/>
+                <c:pt idx="0">
+                  <c:v>Completed Work</c:v>
+                </c:pt>
+              </c:strCache>
+            </c:strRef>
+          </c:tx>
+          <c:spPr>
+            <a:ln w="28575" cap="rnd">
+              <a:solidFill>
+                <a:schemeClr val="accent2"/>
+              </a:solidFill>
+              <a:round/>
+            </a:ln>
+            <a:effectLst/>
+          </c:spPr>
+          <c:marker>
+            <c:symbol val="none"/>
+          </c:marker>
+          <c:cat>
+            <c:numRef>
+              <c:f>'Sprint 1a'!$A$3:$A$12</c:f>
+              <c:numCache>
+                <c:formatCode>m/d/yy</c:formatCode>
+                <c:ptCount val="10"/>
+                <c:pt idx="0">
+                  <c:v>45009</c:v>
+                </c:pt>
+                <c:pt idx="1">
+                  <c:v>45010</c:v>
+                </c:pt>
+                <c:pt idx="2">
+                  <c:v>45012</c:v>
+                </c:pt>
+                <c:pt idx="3">
+                  <c:v>45026</c:v>
+                </c:pt>
+                <c:pt idx="4">
+                  <c:v>45030</c:v>
+                </c:pt>
+                <c:pt idx="5">
+                  <c:v>45033</c:v>
+                </c:pt>
+                <c:pt idx="6">
+                  <c:v>45036</c:v>
+                </c:pt>
+                <c:pt idx="7">
+                  <c:v>45037</c:v>
+                </c:pt>
+                <c:pt idx="8">
+                  <c:v>45041</c:v>
+                </c:pt>
+                <c:pt idx="9">
+                  <c:v>45043</c:v>
+                </c:pt>
+              </c:numCache>
+            </c:numRef>
+          </c:cat>
+          <c:val>
+            <c:numRef>
+              <c:f>'Sprint 1a'!$C$3:$C$12</c:f>
+              <c:numCache>
+                <c:formatCode>General</c:formatCode>
+                <c:ptCount val="10"/>
+                <c:pt idx="0">
+                  <c:v>13</c:v>
+                </c:pt>
+                <c:pt idx="1">
+                  <c:v>15</c:v>
+                </c:pt>
+                <c:pt idx="2">
+                  <c:v>20</c:v>
+                </c:pt>
+                <c:pt idx="3">
+                  <c:v>25</c:v>
+                </c:pt>
+                <c:pt idx="4">
+                  <c:v>38</c:v>
+                </c:pt>
+                <c:pt idx="5">
+                  <c:v>43</c:v>
+                </c:pt>
+                <c:pt idx="6">
+                  <c:v>68</c:v>
+                </c:pt>
+                <c:pt idx="7">
+                  <c:v>69</c:v>
+                </c:pt>
+                <c:pt idx="8">
+                  <c:v>81</c:v>
+                </c:pt>
+                <c:pt idx="9">
+                  <c:v>84</c:v>
+                </c:pt>
+              </c:numCache>
+            </c:numRef>
+          </c:val>
+          <c:smooth val="0"/>
+          <c:extLst>
+            <c:ext xmlns:c16="http://schemas.microsoft.com/office/drawing/2014/chart" uri="{C3380CC4-5D6E-409C-BE32-E72D297353CC}">
+              <c16:uniqueId val="{00000000-98D5-3048-9D79-D9C5A09BCAAB}"/>
+            </c:ext>
+          </c:extLst>
+        </c:ser>
+        <c:ser>
+          <c:idx val="3"/>
+          <c:order val="2"/>
+          <c:tx>
+            <c:strRef>
+              <c:f>'Sprint 1a'!$E$1</c:f>
+              <c:strCache>
+                <c:ptCount val="1"/>
+                <c:pt idx="0">
+                  <c:v>Work Scope</c:v>
+                </c:pt>
+              </c:strCache>
+            </c:strRef>
+          </c:tx>
+          <c:spPr>
+            <a:ln w="28575" cap="rnd">
+              <a:solidFill>
+                <a:schemeClr val="accent4"/>
+              </a:solidFill>
+              <a:round/>
+            </a:ln>
+            <a:effectLst/>
+          </c:spPr>
+          <c:marker>
+            <c:symbol val="none"/>
+          </c:marker>
+          <c:cat>
+            <c:numRef>
+              <c:f>'Sprint 1a'!$A$3:$A$12</c:f>
+              <c:numCache>
+                <c:formatCode>m/d/yy</c:formatCode>
+                <c:ptCount val="10"/>
+                <c:pt idx="0">
+                  <c:v>45009</c:v>
+                </c:pt>
+                <c:pt idx="1">
+                  <c:v>45010</c:v>
+                </c:pt>
+                <c:pt idx="2">
+                  <c:v>45012</c:v>
+                </c:pt>
+                <c:pt idx="3">
+                  <c:v>45026</c:v>
+                </c:pt>
+                <c:pt idx="4">
+                  <c:v>45030</c:v>
+                </c:pt>
+                <c:pt idx="5">
+                  <c:v>45033</c:v>
+                </c:pt>
+                <c:pt idx="6">
+                  <c:v>45036</c:v>
+                </c:pt>
+                <c:pt idx="7">
+                  <c:v>45037</c:v>
+                </c:pt>
+                <c:pt idx="8">
+                  <c:v>45041</c:v>
+                </c:pt>
+                <c:pt idx="9">
+                  <c:v>45043</c:v>
+                </c:pt>
+              </c:numCache>
+            </c:numRef>
+          </c:cat>
+          <c:val>
+            <c:numRef>
+              <c:f>'Sprint 1a'!$E$3:$E$12</c:f>
+              <c:numCache>
+                <c:formatCode>General</c:formatCode>
+                <c:ptCount val="10"/>
+                <c:pt idx="0">
+                  <c:v>85</c:v>
+                </c:pt>
+                <c:pt idx="1">
+                  <c:v>85</c:v>
+                </c:pt>
+                <c:pt idx="2">
+                  <c:v>85</c:v>
+                </c:pt>
+                <c:pt idx="3">
+                  <c:v>85</c:v>
+                </c:pt>
+                <c:pt idx="4">
+                  <c:v>85</c:v>
+                </c:pt>
+                <c:pt idx="5">
+                  <c:v>85</c:v>
+                </c:pt>
+                <c:pt idx="6">
+                  <c:v>85</c:v>
+                </c:pt>
+                <c:pt idx="7">
+                  <c:v>85</c:v>
+                </c:pt>
+                <c:pt idx="8">
+                  <c:v>85</c:v>
+                </c:pt>
+                <c:pt idx="9">
+                  <c:v>85</c:v>
+                </c:pt>
+              </c:numCache>
+            </c:numRef>
+          </c:val>
+          <c:smooth val="0"/>
+          <c:extLst>
+            <c:ext xmlns:c16="http://schemas.microsoft.com/office/drawing/2014/chart" uri="{C3380CC4-5D6E-409C-BE32-E72D297353CC}">
+              <c16:uniqueId val="{00000001-98D5-3048-9D79-D9C5A09BCAAB}"/>
+            </c:ext>
+          </c:extLst>
+        </c:ser>
+        <c:dLbls>
+          <c:showLegendKey val="0"/>
+          <c:showVal val="0"/>
+          <c:showCatName val="0"/>
+          <c:showSerName val="0"/>
+          <c:showPercent val="0"/>
+          <c:showBubbleSize val="0"/>
+        </c:dLbls>
+        <c:smooth val="0"/>
+        <c:axId val="938985504"/>
+        <c:axId val="938960464"/>
+        <c:extLst>
+          <c:ext xmlns:c15="http://schemas.microsoft.com/office/drawing/2012/chart" uri="{02D57815-91ED-43cb-92C2-25804820EDAC}">
+            <c15:filteredLineSeries>
+              <c15:ser>
+                <c:idx val="2"/>
+                <c:order val="1"/>
+                <c:tx>
+                  <c:strRef>
+                    <c:extLst>
+                      <c:ext uri="{02D57815-91ED-43cb-92C2-25804820EDAC}">
+                        <c15:formulaRef>
+                          <c15:sqref>'Sprint 1a'!$D$1</c15:sqref>
+                        </c15:formulaRef>
+                      </c:ext>
+                    </c:extLst>
+                    <c:strCache>
+                      <c:ptCount val="1"/>
+                    </c:strCache>
+                  </c:strRef>
+                </c:tx>
+                <c:spPr>
+                  <a:ln w="28575" cap="rnd">
+                    <a:solidFill>
+                      <a:schemeClr val="accent3"/>
+                    </a:solidFill>
+                    <a:round/>
+                  </a:ln>
+                  <a:effectLst/>
+                </c:spPr>
+                <c:marker>
+                  <c:symbol val="none"/>
+                </c:marker>
+                <c:cat>
+                  <c:numRef>
+                    <c:extLst>
+                      <c:ext uri="{02D57815-91ED-43cb-92C2-25804820EDAC}">
+                        <c15:formulaRef>
+                          <c15:sqref>'Sprint 1a'!$A$3:$A$12</c15:sqref>
+                        </c15:formulaRef>
+                      </c:ext>
+                    </c:extLst>
+                    <c:numCache>
+                      <c:formatCode>m/d/yy</c:formatCode>
+                      <c:ptCount val="10"/>
+                      <c:pt idx="0">
+                        <c:v>45009</c:v>
+                      </c:pt>
+                      <c:pt idx="1">
+                        <c:v>45010</c:v>
+                      </c:pt>
+                      <c:pt idx="2">
+                        <c:v>45012</c:v>
+                      </c:pt>
+                      <c:pt idx="3">
+                        <c:v>45026</c:v>
+                      </c:pt>
+                      <c:pt idx="4">
+                        <c:v>45030</c:v>
+                      </c:pt>
+                      <c:pt idx="5">
+                        <c:v>45033</c:v>
+                      </c:pt>
+                      <c:pt idx="6">
+                        <c:v>45036</c:v>
+                      </c:pt>
+                      <c:pt idx="7">
+                        <c:v>45037</c:v>
+                      </c:pt>
+                      <c:pt idx="8">
+                        <c:v>45041</c:v>
+                      </c:pt>
+                      <c:pt idx="9">
+                        <c:v>45043</c:v>
+                      </c:pt>
+                    </c:numCache>
+                  </c:numRef>
+                </c:cat>
+                <c:val>
+                  <c:numRef>
+                    <c:extLst>
+                      <c:ext uri="{02D57815-91ED-43cb-92C2-25804820EDAC}">
+                        <c15:formulaRef>
+                          <c15:sqref>'Sprint 1a'!$D$3:$D$12</c15:sqref>
+                        </c15:formulaRef>
+                      </c:ext>
+                    </c:extLst>
+                    <c:numCache>
+                      <c:formatCode>General</c:formatCode>
+                      <c:ptCount val="10"/>
+                    </c:numCache>
+                  </c:numRef>
+                </c:val>
+                <c:smooth val="0"/>
+                <c:extLst>
+                  <c:ext xmlns:c16="http://schemas.microsoft.com/office/drawing/2014/chart" uri="{C3380CC4-5D6E-409C-BE32-E72D297353CC}">
+                    <c16:uniqueId val="{00000002-98D5-3048-9D79-D9C5A09BCAAB}"/>
+                  </c:ext>
+                </c:extLst>
+              </c15:ser>
+            </c15:filteredLineSeries>
+          </c:ext>
+        </c:extLst>
+      </c:lineChart>
+      <c:dateAx>
+        <c:axId val="938985504"/>
+        <c:scaling>
+          <c:orientation val="minMax"/>
+        </c:scaling>
+        <c:delete val="0"/>
+        <c:axPos val="b"/>
+        <c:title>
+          <c:tx>
+            <c:rich>
+              <a:bodyPr rot="0" spcFirstLastPara="1" vertOverflow="ellipsis" vert="horz" wrap="square" anchor="ctr" anchorCtr="1"/>
+              <a:lstStyle/>
+              <a:p>
+                <a:pPr>
+                  <a:defRPr sz="1000" b="0" i="0" u="none" strike="noStrike" kern="1200" baseline="0">
+                    <a:solidFill>
+                      <a:schemeClr val="tx1">
+                        <a:lumMod val="65000"/>
+                        <a:lumOff val="35000"/>
+                      </a:schemeClr>
+                    </a:solidFill>
+                    <a:latin typeface="+mn-lt"/>
+                    <a:ea typeface="+mn-ea"/>
+                    <a:cs typeface="+mn-cs"/>
+                  </a:defRPr>
+                </a:pPr>
+                <a:r>
+                  <a:rPr lang="en-US"/>
+                  <a:t>Date</a:t>
+                </a:r>
+              </a:p>
+            </c:rich>
+          </c:tx>
+          <c:overlay val="0"/>
+          <c:spPr>
+            <a:noFill/>
+            <a:ln>
+              <a:noFill/>
+            </a:ln>
+            <a:effectLst/>
+          </c:spPr>
+          <c:txPr>
+            <a:bodyPr rot="0" spcFirstLastPara="1" vertOverflow="ellipsis" vert="horz" wrap="square" anchor="ctr" anchorCtr="1"/>
+            <a:lstStyle/>
+            <a:p>
+              <a:pPr>
+                <a:defRPr sz="1000" b="0" i="0" u="none" strike="noStrike" kern="1200" baseline="0">
+                  <a:solidFill>
+                    <a:schemeClr val="tx1">
+                      <a:lumMod val="65000"/>
+                      <a:lumOff val="35000"/>
+                    </a:schemeClr>
+                  </a:solidFill>
+                  <a:latin typeface="+mn-lt"/>
+                  <a:ea typeface="+mn-ea"/>
+                  <a:cs typeface="+mn-cs"/>
+                </a:defRPr>
+              </a:pPr>
+              <a:endParaRPr lang="en-US"/>
+            </a:p>
+          </c:txPr>
+        </c:title>
+        <c:numFmt formatCode="m/d/yy" sourceLinked="1"/>
+        <c:majorTickMark val="out"/>
+        <c:minorTickMark val="none"/>
+        <c:tickLblPos val="nextTo"/>
+        <c:spPr>
+          <a:noFill/>
+          <a:ln w="9525" cap="flat" cmpd="sng" algn="ctr">
+            <a:solidFill>
+              <a:schemeClr val="tx1">
+                <a:lumMod val="15000"/>
+                <a:lumOff val="85000"/>
+              </a:schemeClr>
+            </a:solidFill>
+            <a:round/>
+          </a:ln>
+          <a:effectLst/>
+        </c:spPr>
+        <c:txPr>
+          <a:bodyPr rot="-60000000" spcFirstLastPara="1" vertOverflow="ellipsis" vert="horz" wrap="square" anchor="ctr" anchorCtr="1"/>
+          <a:lstStyle/>
+          <a:p>
+            <a:pPr>
+              <a:defRPr sz="900" b="0" i="0" u="none" strike="noStrike" kern="1200" baseline="0">
+                <a:solidFill>
+                  <a:schemeClr val="tx1">
+                    <a:lumMod val="65000"/>
+                    <a:lumOff val="35000"/>
+                  </a:schemeClr>
+                </a:solidFill>
+                <a:latin typeface="+mn-lt"/>
+                <a:ea typeface="+mn-ea"/>
+                <a:cs typeface="+mn-cs"/>
+              </a:defRPr>
+            </a:pPr>
+            <a:endParaRPr lang="en-US"/>
+          </a:p>
+        </c:txPr>
+        <c:crossAx val="938960464"/>
+        <c:crosses val="autoZero"/>
+        <c:auto val="1"/>
+        <c:lblOffset val="100"/>
+        <c:baseTimeUnit val="days"/>
+      </c:dateAx>
+      <c:valAx>
+        <c:axId val="938960464"/>
+        <c:scaling>
+          <c:orientation val="minMax"/>
+        </c:scaling>
+        <c:delete val="0"/>
+        <c:axPos val="l"/>
+        <c:majorGridlines>
+          <c:spPr>
+            <a:ln w="9525" cap="flat" cmpd="sng" algn="ctr">
+              <a:solidFill>
+                <a:schemeClr val="tx1">
+                  <a:lumMod val="15000"/>
+                  <a:lumOff val="85000"/>
+                </a:schemeClr>
+              </a:solidFill>
+              <a:round/>
+            </a:ln>
+            <a:effectLst/>
+          </c:spPr>
+        </c:majorGridlines>
+        <c:title>
+          <c:tx>
+            <c:rich>
+              <a:bodyPr rot="-5400000" spcFirstLastPara="1" vertOverflow="ellipsis" vert="horz" wrap="square" anchor="ctr" anchorCtr="1"/>
+              <a:lstStyle/>
+              <a:p>
+                <a:pPr>
+                  <a:defRPr sz="1000" b="0" i="0" u="none" strike="noStrike" kern="1200" baseline="0">
+                    <a:solidFill>
+                      <a:schemeClr val="tx1">
+                        <a:lumMod val="65000"/>
+                        <a:lumOff val="35000"/>
+                      </a:schemeClr>
+                    </a:solidFill>
+                    <a:latin typeface="+mn-lt"/>
+                    <a:ea typeface="+mn-ea"/>
+                    <a:cs typeface="+mn-cs"/>
+                  </a:defRPr>
+                </a:pPr>
+                <a:r>
+                  <a:rPr lang="en-US"/>
+                  <a:t>Story Point</a:t>
+                </a:r>
+              </a:p>
+            </c:rich>
+          </c:tx>
+          <c:overlay val="0"/>
+          <c:spPr>
+            <a:noFill/>
+            <a:ln>
+              <a:noFill/>
+            </a:ln>
+            <a:effectLst/>
+          </c:spPr>
+          <c:txPr>
+            <a:bodyPr rot="-5400000" spcFirstLastPara="1" vertOverflow="ellipsis" vert="horz" wrap="square" anchor="ctr" anchorCtr="1"/>
+            <a:lstStyle/>
+            <a:p>
+              <a:pPr>
+                <a:defRPr sz="1000" b="0" i="0" u="none" strike="noStrike" kern="1200" baseline="0">
+                  <a:solidFill>
+                    <a:schemeClr val="tx1">
+                      <a:lumMod val="65000"/>
+                      <a:lumOff val="35000"/>
+                    </a:schemeClr>
+                  </a:solidFill>
+                  <a:latin typeface="+mn-lt"/>
+                  <a:ea typeface="+mn-ea"/>
+                  <a:cs typeface="+mn-cs"/>
+                </a:defRPr>
+              </a:pPr>
+              <a:endParaRPr lang="en-US"/>
+            </a:p>
+          </c:txPr>
+        </c:title>
+        <c:numFmt formatCode="General" sourceLinked="1"/>
+        <c:majorTickMark val="none"/>
+        <c:minorTickMark val="none"/>
+        <c:tickLblPos val="nextTo"/>
+        <c:spPr>
+          <a:noFill/>
+          <a:ln>
+            <a:noFill/>
+          </a:ln>
+          <a:effectLst/>
+        </c:spPr>
+        <c:txPr>
+          <a:bodyPr rot="-60000000" spcFirstLastPara="1" vertOverflow="ellipsis" vert="horz" wrap="square" anchor="ctr" anchorCtr="1"/>
+          <a:lstStyle/>
+          <a:p>
+            <a:pPr>
+              <a:defRPr sz="900" b="0" i="0" u="none" strike="noStrike" kern="1200" baseline="0">
+                <a:solidFill>
+                  <a:schemeClr val="tx1">
+                    <a:lumMod val="65000"/>
+                    <a:lumOff val="35000"/>
+                  </a:schemeClr>
+                </a:solidFill>
+                <a:latin typeface="+mn-lt"/>
+                <a:ea typeface="+mn-ea"/>
+                <a:cs typeface="+mn-cs"/>
+              </a:defRPr>
+            </a:pPr>
+            <a:endParaRPr lang="en-US"/>
+          </a:p>
+        </c:txPr>
+        <c:crossAx val="938985504"/>
+        <c:crosses val="autoZero"/>
+        <c:crossBetween val="between"/>
+      </c:valAx>
+      <c:spPr>
+        <a:noFill/>
+        <a:ln>
+          <a:noFill/>
+        </a:ln>
+        <a:effectLst/>
+      </c:spPr>
+    </c:plotArea>
+    <c:legend>
+      <c:legendPos val="b"/>
+      <c:overlay val="0"/>
+      <c:spPr>
+        <a:noFill/>
+        <a:ln>
+          <a:noFill/>
+        </a:ln>
+        <a:effectLst/>
+      </c:spPr>
+      <c:txPr>
+        <a:bodyPr rot="0" spcFirstLastPara="1" vertOverflow="ellipsis" vert="horz" wrap="square" anchor="ctr" anchorCtr="1"/>
+        <a:lstStyle/>
+        <a:p>
+          <a:pPr>
+            <a:defRPr sz="900" b="0" i="0" u="none" strike="noStrike" kern="1200" baseline="0">
+              <a:solidFill>
+                <a:schemeClr val="tx1">
+                  <a:lumMod val="65000"/>
+                  <a:lumOff val="35000"/>
+                </a:schemeClr>
+              </a:solidFill>
+              <a:latin typeface="+mn-lt"/>
+              <a:ea typeface="+mn-ea"/>
+              <a:cs typeface="+mn-cs"/>
+            </a:defRPr>
+          </a:pPr>
+          <a:endParaRPr lang="en-US"/>
+        </a:p>
+      </c:txPr>
+    </c:legend>
+    <c:plotVisOnly val="1"/>
+    <c:dispBlanksAs val="gap"/>
+    <c:showDLblsOverMax val="0"/>
+  </c:chart>
+  <c:spPr>
+    <a:noFill/>
+    <a:ln>
+      <a:noFill/>
+    </a:ln>
+    <a:effectLst/>
+  </c:spPr>
+  <c:txPr>
+    <a:bodyPr/>
+    <a:lstStyle/>
+    <a:p>
+      <a:pPr>
+        <a:defRPr/>
+      </a:pPr>
+      <a:endParaRPr lang="en-US"/>
+    </a:p>
+  </c:txPr>
+  <c:externalData r:id="rId3">
+    <c:autoUpdate val="0"/>
+  </c:externalData>
+</c:chartSpace>
+</file>
+
 <file path=ppt/charts/colors1.xml><?xml version="1.0" encoding="utf-8"?>
 <cs:colorStyle xmlns:cs="http://schemas.microsoft.com/office/drawing/2012/chartStyle" xmlns:a="http://schemas.openxmlformats.org/drawingml/2006/main" meth="cycle" id="10">
   <a:schemeClr val="accent1"/>
@@ -2768,6 +4669,166 @@
 </cs:colorStyle>
 </file>
 
+<file path=ppt/charts/colors6.xml><?xml version="1.0" encoding="utf-8"?>
+<cs:colorStyle xmlns:cs="http://schemas.microsoft.com/office/drawing/2012/chartStyle" xmlns:a="http://schemas.openxmlformats.org/drawingml/2006/main" meth="cycle" id="10">
+  <a:schemeClr val="accent1"/>
+  <a:schemeClr val="accent2"/>
+  <a:schemeClr val="accent3"/>
+  <a:schemeClr val="accent4"/>
+  <a:schemeClr val="accent5"/>
+  <a:schemeClr val="accent6"/>
+  <cs:variation/>
+  <cs:variation>
+    <a:lumMod val="60000"/>
+  </cs:variation>
+  <cs:variation>
+    <a:lumMod val="80000"/>
+    <a:lumOff val="20000"/>
+  </cs:variation>
+  <cs:variation>
+    <a:lumMod val="80000"/>
+  </cs:variation>
+  <cs:variation>
+    <a:lumMod val="60000"/>
+    <a:lumOff val="40000"/>
+  </cs:variation>
+  <cs:variation>
+    <a:lumMod val="50000"/>
+  </cs:variation>
+  <cs:variation>
+    <a:lumMod val="70000"/>
+    <a:lumOff val="30000"/>
+  </cs:variation>
+  <cs:variation>
+    <a:lumMod val="70000"/>
+  </cs:variation>
+  <cs:variation>
+    <a:lumMod val="50000"/>
+    <a:lumOff val="50000"/>
+  </cs:variation>
+</cs:colorStyle>
+</file>
+
+<file path=ppt/charts/colors7.xml><?xml version="1.0" encoding="utf-8"?>
+<cs:colorStyle xmlns:cs="http://schemas.microsoft.com/office/drawing/2012/chartStyle" xmlns:a="http://schemas.openxmlformats.org/drawingml/2006/main" meth="cycle" id="10">
+  <a:schemeClr val="accent1"/>
+  <a:schemeClr val="accent2"/>
+  <a:schemeClr val="accent3"/>
+  <a:schemeClr val="accent4"/>
+  <a:schemeClr val="accent5"/>
+  <a:schemeClr val="accent6"/>
+  <cs:variation/>
+  <cs:variation>
+    <a:lumMod val="60000"/>
+  </cs:variation>
+  <cs:variation>
+    <a:lumMod val="80000"/>
+    <a:lumOff val="20000"/>
+  </cs:variation>
+  <cs:variation>
+    <a:lumMod val="80000"/>
+  </cs:variation>
+  <cs:variation>
+    <a:lumMod val="60000"/>
+    <a:lumOff val="40000"/>
+  </cs:variation>
+  <cs:variation>
+    <a:lumMod val="50000"/>
+  </cs:variation>
+  <cs:variation>
+    <a:lumMod val="70000"/>
+    <a:lumOff val="30000"/>
+  </cs:variation>
+  <cs:variation>
+    <a:lumMod val="70000"/>
+  </cs:variation>
+  <cs:variation>
+    <a:lumMod val="50000"/>
+    <a:lumOff val="50000"/>
+  </cs:variation>
+</cs:colorStyle>
+</file>
+
+<file path=ppt/charts/colors8.xml><?xml version="1.0" encoding="utf-8"?>
+<cs:colorStyle xmlns:cs="http://schemas.microsoft.com/office/drawing/2012/chartStyle" xmlns:a="http://schemas.openxmlformats.org/drawingml/2006/main" meth="cycle" id="10">
+  <a:schemeClr val="accent1"/>
+  <a:schemeClr val="accent2"/>
+  <a:schemeClr val="accent3"/>
+  <a:schemeClr val="accent4"/>
+  <a:schemeClr val="accent5"/>
+  <a:schemeClr val="accent6"/>
+  <cs:variation/>
+  <cs:variation>
+    <a:lumMod val="60000"/>
+  </cs:variation>
+  <cs:variation>
+    <a:lumMod val="80000"/>
+    <a:lumOff val="20000"/>
+  </cs:variation>
+  <cs:variation>
+    <a:lumMod val="80000"/>
+  </cs:variation>
+  <cs:variation>
+    <a:lumMod val="60000"/>
+    <a:lumOff val="40000"/>
+  </cs:variation>
+  <cs:variation>
+    <a:lumMod val="50000"/>
+  </cs:variation>
+  <cs:variation>
+    <a:lumMod val="70000"/>
+    <a:lumOff val="30000"/>
+  </cs:variation>
+  <cs:variation>
+    <a:lumMod val="70000"/>
+  </cs:variation>
+  <cs:variation>
+    <a:lumMod val="50000"/>
+    <a:lumOff val="50000"/>
+  </cs:variation>
+</cs:colorStyle>
+</file>
+
+<file path=ppt/charts/colors9.xml><?xml version="1.0" encoding="utf-8"?>
+<cs:colorStyle xmlns:cs="http://schemas.microsoft.com/office/drawing/2012/chartStyle" xmlns:a="http://schemas.openxmlformats.org/drawingml/2006/main" meth="cycle" id="10">
+  <a:schemeClr val="accent1"/>
+  <a:schemeClr val="accent2"/>
+  <a:schemeClr val="accent3"/>
+  <a:schemeClr val="accent4"/>
+  <a:schemeClr val="accent5"/>
+  <a:schemeClr val="accent6"/>
+  <cs:variation/>
+  <cs:variation>
+    <a:lumMod val="60000"/>
+  </cs:variation>
+  <cs:variation>
+    <a:lumMod val="80000"/>
+    <a:lumOff val="20000"/>
+  </cs:variation>
+  <cs:variation>
+    <a:lumMod val="80000"/>
+  </cs:variation>
+  <cs:variation>
+    <a:lumMod val="60000"/>
+    <a:lumOff val="40000"/>
+  </cs:variation>
+  <cs:variation>
+    <a:lumMod val="50000"/>
+  </cs:variation>
+  <cs:variation>
+    <a:lumMod val="70000"/>
+    <a:lumOff val="30000"/>
+  </cs:variation>
+  <cs:variation>
+    <a:lumMod val="70000"/>
+  </cs:variation>
+  <cs:variation>
+    <a:lumMod val="50000"/>
+    <a:lumOff val="50000"/>
+  </cs:variation>
+</cs:colorStyle>
+</file>
+
 <file path=ppt/charts/style1.xml><?xml version="1.0" encoding="utf-8"?>
 <cs:chartStyle xmlns:cs="http://schemas.microsoft.com/office/drawing/2012/chartStyle" xmlns:a="http://schemas.openxmlformats.org/drawingml/2006/main" id="201">
   <cs:axisTitle>
@@ -4823,6 +6884,2060 @@
 </file>
 
 <file path=ppt/charts/style5.xml><?xml version="1.0" encoding="utf-8"?>
+<cs:chartStyle xmlns:cs="http://schemas.microsoft.com/office/drawing/2012/chartStyle" xmlns:a="http://schemas.openxmlformats.org/drawingml/2006/main" id="227">
+  <cs:axisTitle>
+    <cs:lnRef idx="0"/>
+    <cs:fillRef idx="0"/>
+    <cs:effectRef idx="0"/>
+    <cs:fontRef idx="minor">
+      <a:schemeClr val="tx1">
+        <a:lumMod val="65000"/>
+        <a:lumOff val="35000"/>
+      </a:schemeClr>
+    </cs:fontRef>
+    <cs:defRPr sz="1000" kern="1200"/>
+  </cs:axisTitle>
+  <cs:categoryAxis>
+    <cs:lnRef idx="0"/>
+    <cs:fillRef idx="0"/>
+    <cs:effectRef idx="0"/>
+    <cs:fontRef idx="minor">
+      <a:schemeClr val="tx1">
+        <a:lumMod val="65000"/>
+        <a:lumOff val="35000"/>
+      </a:schemeClr>
+    </cs:fontRef>
+    <cs:spPr>
+      <a:ln w="9525" cap="flat" cmpd="sng" algn="ctr">
+        <a:solidFill>
+          <a:schemeClr val="tx1">
+            <a:lumMod val="15000"/>
+            <a:lumOff val="85000"/>
+          </a:schemeClr>
+        </a:solidFill>
+        <a:round/>
+      </a:ln>
+    </cs:spPr>
+    <cs:defRPr sz="900" kern="1200"/>
+  </cs:categoryAxis>
+  <cs:chartArea mods="allowNoFillOverride allowNoLineOverride">
+    <cs:lnRef idx="0"/>
+    <cs:fillRef idx="0"/>
+    <cs:effectRef idx="0"/>
+    <cs:fontRef idx="minor">
+      <a:schemeClr val="tx1"/>
+    </cs:fontRef>
+    <cs:spPr>
+      <a:solidFill>
+        <a:schemeClr val="bg1"/>
+      </a:solidFill>
+      <a:ln w="9525" cap="flat" cmpd="sng" algn="ctr">
+        <a:solidFill>
+          <a:schemeClr val="tx1">
+            <a:lumMod val="15000"/>
+            <a:lumOff val="85000"/>
+          </a:schemeClr>
+        </a:solidFill>
+        <a:round/>
+      </a:ln>
+    </cs:spPr>
+    <cs:defRPr sz="1000" kern="1200"/>
+  </cs:chartArea>
+  <cs:dataLabel>
+    <cs:lnRef idx="0"/>
+    <cs:fillRef idx="0"/>
+    <cs:effectRef idx="0"/>
+    <cs:fontRef idx="minor">
+      <a:schemeClr val="tx1">
+        <a:lumMod val="75000"/>
+        <a:lumOff val="25000"/>
+      </a:schemeClr>
+    </cs:fontRef>
+    <cs:defRPr sz="900" kern="1200"/>
+  </cs:dataLabel>
+  <cs:dataLabelCallout>
+    <cs:lnRef idx="0"/>
+    <cs:fillRef idx="0"/>
+    <cs:effectRef idx="0"/>
+    <cs:fontRef idx="minor">
+      <a:schemeClr val="dk1">
+        <a:lumMod val="65000"/>
+        <a:lumOff val="35000"/>
+      </a:schemeClr>
+    </cs:fontRef>
+    <cs:spPr>
+      <a:solidFill>
+        <a:schemeClr val="lt1"/>
+      </a:solidFill>
+      <a:ln>
+        <a:solidFill>
+          <a:schemeClr val="dk1">
+            <a:lumMod val="25000"/>
+            <a:lumOff val="75000"/>
+          </a:schemeClr>
+        </a:solidFill>
+      </a:ln>
+    </cs:spPr>
+    <cs:defRPr sz="900" kern="1200"/>
+    <cs:bodyPr rot="0" spcFirstLastPara="1" vertOverflow="clip" horzOverflow="clip" vert="horz" wrap="square" lIns="36576" tIns="18288" rIns="36576" bIns="18288" anchor="ctr" anchorCtr="1">
+      <a:spAutoFit/>
+    </cs:bodyPr>
+  </cs:dataLabelCallout>
+  <cs:dataPoint>
+    <cs:lnRef idx="0"/>
+    <cs:fillRef idx="1">
+      <cs:styleClr val="auto"/>
+    </cs:fillRef>
+    <cs:effectRef idx="0"/>
+    <cs:fontRef idx="minor">
+      <a:schemeClr val="tx1"/>
+    </cs:fontRef>
+    <cs:spPr>
+      <a:solidFill>
+        <a:schemeClr val="phClr"/>
+      </a:solidFill>
+    </cs:spPr>
+  </cs:dataPoint>
+  <cs:dataPoint3D>
+    <cs:lnRef idx="0"/>
+    <cs:fillRef idx="1">
+      <cs:styleClr val="auto"/>
+    </cs:fillRef>
+    <cs:effectRef idx="0"/>
+    <cs:fontRef idx="minor">
+      <a:schemeClr val="tx1"/>
+    </cs:fontRef>
+    <cs:spPr>
+      <a:solidFill>
+        <a:schemeClr val="phClr"/>
+      </a:solidFill>
+    </cs:spPr>
+  </cs:dataPoint3D>
+  <cs:dataPointLine>
+    <cs:lnRef idx="0">
+      <cs:styleClr val="auto"/>
+    </cs:lnRef>
+    <cs:fillRef idx="1"/>
+    <cs:effectRef idx="0"/>
+    <cs:fontRef idx="minor">
+      <a:schemeClr val="tx1"/>
+    </cs:fontRef>
+    <cs:spPr>
+      <a:ln w="28575" cap="rnd">
+        <a:solidFill>
+          <a:schemeClr val="phClr"/>
+        </a:solidFill>
+        <a:round/>
+      </a:ln>
+    </cs:spPr>
+  </cs:dataPointLine>
+  <cs:dataPointMarker>
+    <cs:lnRef idx="0">
+      <cs:styleClr val="auto"/>
+    </cs:lnRef>
+    <cs:fillRef idx="1">
+      <cs:styleClr val="auto"/>
+    </cs:fillRef>
+    <cs:effectRef idx="0"/>
+    <cs:fontRef idx="minor">
+      <a:schemeClr val="tx1"/>
+    </cs:fontRef>
+    <cs:spPr>
+      <a:solidFill>
+        <a:schemeClr val="phClr"/>
+      </a:solidFill>
+      <a:ln w="9525">
+        <a:solidFill>
+          <a:schemeClr val="phClr"/>
+        </a:solidFill>
+      </a:ln>
+    </cs:spPr>
+  </cs:dataPointMarker>
+  <cs:dataPointMarkerLayout symbol="circle" size="5"/>
+  <cs:dataPointWireframe>
+    <cs:lnRef idx="0">
+      <cs:styleClr val="auto"/>
+    </cs:lnRef>
+    <cs:fillRef idx="1"/>
+    <cs:effectRef idx="0"/>
+    <cs:fontRef idx="minor">
+      <a:schemeClr val="tx1"/>
+    </cs:fontRef>
+    <cs:spPr>
+      <a:ln w="9525" cap="rnd">
+        <a:solidFill>
+          <a:schemeClr val="phClr"/>
+        </a:solidFill>
+        <a:round/>
+      </a:ln>
+    </cs:spPr>
+  </cs:dataPointWireframe>
+  <cs:dataTable>
+    <cs:lnRef idx="0"/>
+    <cs:fillRef idx="0"/>
+    <cs:effectRef idx="0"/>
+    <cs:fontRef idx="minor">
+      <a:schemeClr val="tx1">
+        <a:lumMod val="65000"/>
+        <a:lumOff val="35000"/>
+      </a:schemeClr>
+    </cs:fontRef>
+    <cs:spPr>
+      <a:noFill/>
+      <a:ln w="9525" cap="flat" cmpd="sng" algn="ctr">
+        <a:solidFill>
+          <a:schemeClr val="tx1">
+            <a:lumMod val="15000"/>
+            <a:lumOff val="85000"/>
+          </a:schemeClr>
+        </a:solidFill>
+        <a:round/>
+      </a:ln>
+    </cs:spPr>
+    <cs:defRPr sz="900" kern="1200"/>
+  </cs:dataTable>
+  <cs:downBar>
+    <cs:lnRef idx="0"/>
+    <cs:fillRef idx="0"/>
+    <cs:effectRef idx="0"/>
+    <cs:fontRef idx="minor">
+      <a:schemeClr val="dk1"/>
+    </cs:fontRef>
+    <cs:spPr>
+      <a:solidFill>
+        <a:schemeClr val="dk1">
+          <a:lumMod val="65000"/>
+          <a:lumOff val="35000"/>
+        </a:schemeClr>
+      </a:solidFill>
+      <a:ln w="9525">
+        <a:solidFill>
+          <a:schemeClr val="tx1">
+            <a:lumMod val="65000"/>
+            <a:lumOff val="35000"/>
+          </a:schemeClr>
+        </a:solidFill>
+      </a:ln>
+    </cs:spPr>
+  </cs:downBar>
+  <cs:dropLine>
+    <cs:lnRef idx="0"/>
+    <cs:fillRef idx="0"/>
+    <cs:effectRef idx="0"/>
+    <cs:fontRef idx="minor">
+      <a:schemeClr val="tx1"/>
+    </cs:fontRef>
+    <cs:spPr>
+      <a:ln w="9525" cap="flat" cmpd="sng" algn="ctr">
+        <a:solidFill>
+          <a:schemeClr val="tx1">
+            <a:lumMod val="35000"/>
+            <a:lumOff val="65000"/>
+          </a:schemeClr>
+        </a:solidFill>
+        <a:round/>
+      </a:ln>
+    </cs:spPr>
+  </cs:dropLine>
+  <cs:errorBar>
+    <cs:lnRef idx="0"/>
+    <cs:fillRef idx="0"/>
+    <cs:effectRef idx="0"/>
+    <cs:fontRef idx="minor">
+      <a:schemeClr val="tx1"/>
+    </cs:fontRef>
+    <cs:spPr>
+      <a:ln w="9525" cap="flat" cmpd="sng" algn="ctr">
+        <a:solidFill>
+          <a:schemeClr val="tx1">
+            <a:lumMod val="65000"/>
+            <a:lumOff val="35000"/>
+          </a:schemeClr>
+        </a:solidFill>
+        <a:round/>
+      </a:ln>
+    </cs:spPr>
+  </cs:errorBar>
+  <cs:floor>
+    <cs:lnRef idx="0"/>
+    <cs:fillRef idx="0"/>
+    <cs:effectRef idx="0"/>
+    <cs:fontRef idx="minor">
+      <a:schemeClr val="tx1"/>
+    </cs:fontRef>
+    <cs:spPr>
+      <a:noFill/>
+      <a:ln>
+        <a:noFill/>
+      </a:ln>
+    </cs:spPr>
+  </cs:floor>
+  <cs:gridlineMajor>
+    <cs:lnRef idx="0"/>
+    <cs:fillRef idx="0"/>
+    <cs:effectRef idx="0"/>
+    <cs:fontRef idx="minor">
+      <a:schemeClr val="tx1"/>
+    </cs:fontRef>
+    <cs:spPr>
+      <a:ln w="9525" cap="flat" cmpd="sng" algn="ctr">
+        <a:solidFill>
+          <a:schemeClr val="tx1">
+            <a:lumMod val="15000"/>
+            <a:lumOff val="85000"/>
+          </a:schemeClr>
+        </a:solidFill>
+        <a:round/>
+      </a:ln>
+    </cs:spPr>
+  </cs:gridlineMajor>
+  <cs:gridlineMinor>
+    <cs:lnRef idx="0"/>
+    <cs:fillRef idx="0"/>
+    <cs:effectRef idx="0"/>
+    <cs:fontRef idx="minor">
+      <a:schemeClr val="tx1"/>
+    </cs:fontRef>
+    <cs:spPr>
+      <a:ln w="9525" cap="flat" cmpd="sng" algn="ctr">
+        <a:solidFill>
+          <a:schemeClr val="tx1">
+            <a:lumMod val="5000"/>
+            <a:lumOff val="95000"/>
+          </a:schemeClr>
+        </a:solidFill>
+        <a:round/>
+      </a:ln>
+    </cs:spPr>
+  </cs:gridlineMinor>
+  <cs:hiLoLine>
+    <cs:lnRef idx="0"/>
+    <cs:fillRef idx="0"/>
+    <cs:effectRef idx="0"/>
+    <cs:fontRef idx="minor">
+      <a:schemeClr val="tx1"/>
+    </cs:fontRef>
+    <cs:spPr>
+      <a:ln w="9525" cap="flat" cmpd="sng" algn="ctr">
+        <a:solidFill>
+          <a:schemeClr val="tx1">
+            <a:lumMod val="75000"/>
+            <a:lumOff val="25000"/>
+          </a:schemeClr>
+        </a:solidFill>
+        <a:round/>
+      </a:ln>
+    </cs:spPr>
+  </cs:hiLoLine>
+  <cs:leaderLine>
+    <cs:lnRef idx="0"/>
+    <cs:fillRef idx="0"/>
+    <cs:effectRef idx="0"/>
+    <cs:fontRef idx="minor">
+      <a:schemeClr val="tx1"/>
+    </cs:fontRef>
+    <cs:spPr>
+      <a:ln w="9525" cap="flat" cmpd="sng" algn="ctr">
+        <a:solidFill>
+          <a:schemeClr val="tx1">
+            <a:lumMod val="35000"/>
+            <a:lumOff val="65000"/>
+          </a:schemeClr>
+        </a:solidFill>
+        <a:round/>
+      </a:ln>
+    </cs:spPr>
+  </cs:leaderLine>
+  <cs:legend>
+    <cs:lnRef idx="0"/>
+    <cs:fillRef idx="0"/>
+    <cs:effectRef idx="0"/>
+    <cs:fontRef idx="minor">
+      <a:schemeClr val="tx1">
+        <a:lumMod val="65000"/>
+        <a:lumOff val="35000"/>
+      </a:schemeClr>
+    </cs:fontRef>
+    <cs:defRPr sz="900" kern="1200"/>
+  </cs:legend>
+  <cs:plotArea mods="allowNoFillOverride allowNoLineOverride">
+    <cs:lnRef idx="0"/>
+    <cs:fillRef idx="0"/>
+    <cs:effectRef idx="0"/>
+    <cs:fontRef idx="minor">
+      <a:schemeClr val="tx1"/>
+    </cs:fontRef>
+  </cs:plotArea>
+  <cs:plotArea3D mods="allowNoFillOverride allowNoLineOverride">
+    <cs:lnRef idx="0"/>
+    <cs:fillRef idx="0"/>
+    <cs:effectRef idx="0"/>
+    <cs:fontRef idx="minor">
+      <a:schemeClr val="tx1"/>
+    </cs:fontRef>
+  </cs:plotArea3D>
+  <cs:seriesAxis>
+    <cs:lnRef idx="0"/>
+    <cs:fillRef idx="0"/>
+    <cs:effectRef idx="0"/>
+    <cs:fontRef idx="minor">
+      <a:schemeClr val="tx1">
+        <a:lumMod val="65000"/>
+        <a:lumOff val="35000"/>
+      </a:schemeClr>
+    </cs:fontRef>
+    <cs:defRPr sz="900" kern="1200"/>
+  </cs:seriesAxis>
+  <cs:seriesLine>
+    <cs:lnRef idx="0"/>
+    <cs:fillRef idx="0"/>
+    <cs:effectRef idx="0"/>
+    <cs:fontRef idx="minor">
+      <a:schemeClr val="tx1"/>
+    </cs:fontRef>
+    <cs:spPr>
+      <a:ln w="9525" cap="flat" cmpd="sng" algn="ctr">
+        <a:solidFill>
+          <a:schemeClr val="tx1">
+            <a:lumMod val="35000"/>
+            <a:lumOff val="65000"/>
+          </a:schemeClr>
+        </a:solidFill>
+        <a:round/>
+      </a:ln>
+    </cs:spPr>
+  </cs:seriesLine>
+  <cs:title>
+    <cs:lnRef idx="0"/>
+    <cs:fillRef idx="0"/>
+    <cs:effectRef idx="0"/>
+    <cs:fontRef idx="minor">
+      <a:schemeClr val="tx1">
+        <a:lumMod val="65000"/>
+        <a:lumOff val="35000"/>
+      </a:schemeClr>
+    </cs:fontRef>
+    <cs:defRPr sz="1400" b="0" kern="1200" spc="0" baseline="0"/>
+  </cs:title>
+  <cs:trendline>
+    <cs:lnRef idx="0">
+      <cs:styleClr val="auto"/>
+    </cs:lnRef>
+    <cs:fillRef idx="0"/>
+    <cs:effectRef idx="0"/>
+    <cs:fontRef idx="minor">
+      <a:schemeClr val="tx1"/>
+    </cs:fontRef>
+    <cs:spPr>
+      <a:ln w="19050" cap="rnd">
+        <a:solidFill>
+          <a:schemeClr val="phClr"/>
+        </a:solidFill>
+        <a:prstDash val="sysDot"/>
+      </a:ln>
+    </cs:spPr>
+  </cs:trendline>
+  <cs:trendlineLabel>
+    <cs:lnRef idx="0"/>
+    <cs:fillRef idx="0"/>
+    <cs:effectRef idx="0"/>
+    <cs:fontRef idx="minor">
+      <a:schemeClr val="tx1">
+        <a:lumMod val="65000"/>
+        <a:lumOff val="35000"/>
+      </a:schemeClr>
+    </cs:fontRef>
+    <cs:defRPr sz="900" kern="1200"/>
+  </cs:trendlineLabel>
+  <cs:upBar>
+    <cs:lnRef idx="0"/>
+    <cs:fillRef idx="0"/>
+    <cs:effectRef idx="0"/>
+    <cs:fontRef idx="minor">
+      <a:schemeClr val="dk1"/>
+    </cs:fontRef>
+    <cs:spPr>
+      <a:solidFill>
+        <a:schemeClr val="lt1"/>
+      </a:solidFill>
+      <a:ln w="9525">
+        <a:solidFill>
+          <a:schemeClr val="tx1">
+            <a:lumMod val="15000"/>
+            <a:lumOff val="85000"/>
+          </a:schemeClr>
+        </a:solidFill>
+      </a:ln>
+    </cs:spPr>
+  </cs:upBar>
+  <cs:valueAxis>
+    <cs:lnRef idx="0"/>
+    <cs:fillRef idx="0"/>
+    <cs:effectRef idx="0"/>
+    <cs:fontRef idx="minor">
+      <a:schemeClr val="tx1">
+        <a:lumMod val="65000"/>
+        <a:lumOff val="35000"/>
+      </a:schemeClr>
+    </cs:fontRef>
+    <cs:defRPr sz="900" kern="1200"/>
+  </cs:valueAxis>
+  <cs:wall>
+    <cs:lnRef idx="0"/>
+    <cs:fillRef idx="0"/>
+    <cs:effectRef idx="0"/>
+    <cs:fontRef idx="minor">
+      <a:schemeClr val="tx1"/>
+    </cs:fontRef>
+    <cs:spPr>
+      <a:noFill/>
+      <a:ln>
+        <a:noFill/>
+      </a:ln>
+    </cs:spPr>
+  </cs:wall>
+</cs:chartStyle>
+</file>
+
+<file path=ppt/charts/style6.xml><?xml version="1.0" encoding="utf-8"?>
+<cs:chartStyle xmlns:cs="http://schemas.microsoft.com/office/drawing/2012/chartStyle" xmlns:a="http://schemas.openxmlformats.org/drawingml/2006/main" id="201">
+  <cs:axisTitle>
+    <cs:lnRef idx="0"/>
+    <cs:fillRef idx="0"/>
+    <cs:effectRef idx="0"/>
+    <cs:fontRef idx="minor">
+      <a:schemeClr val="tx1">
+        <a:lumMod val="65000"/>
+        <a:lumOff val="35000"/>
+      </a:schemeClr>
+    </cs:fontRef>
+    <cs:defRPr sz="1330" kern="1200"/>
+  </cs:axisTitle>
+  <cs:categoryAxis>
+    <cs:lnRef idx="0"/>
+    <cs:fillRef idx="0"/>
+    <cs:effectRef idx="0"/>
+    <cs:fontRef idx="minor">
+      <a:schemeClr val="tx1">
+        <a:lumMod val="65000"/>
+        <a:lumOff val="35000"/>
+      </a:schemeClr>
+    </cs:fontRef>
+    <cs:spPr>
+      <a:ln w="9525" cap="flat" cmpd="sng" algn="ctr">
+        <a:solidFill>
+          <a:schemeClr val="tx1">
+            <a:lumMod val="15000"/>
+            <a:lumOff val="85000"/>
+          </a:schemeClr>
+        </a:solidFill>
+        <a:round/>
+      </a:ln>
+    </cs:spPr>
+    <cs:defRPr sz="1197" kern="1200"/>
+  </cs:categoryAxis>
+  <cs:chartArea mods="allowNoFillOverride allowNoLineOverride">
+    <cs:lnRef idx="0"/>
+    <cs:fillRef idx="0"/>
+    <cs:effectRef idx="0"/>
+    <cs:fontRef idx="minor">
+      <a:schemeClr val="tx1"/>
+    </cs:fontRef>
+    <cs:spPr>
+      <a:solidFill>
+        <a:schemeClr val="bg1"/>
+      </a:solidFill>
+      <a:ln w="9525" cap="flat" cmpd="sng" algn="ctr">
+        <a:solidFill>
+          <a:schemeClr val="tx1">
+            <a:lumMod val="15000"/>
+            <a:lumOff val="85000"/>
+          </a:schemeClr>
+        </a:solidFill>
+        <a:round/>
+      </a:ln>
+    </cs:spPr>
+    <cs:defRPr sz="1330" kern="1200"/>
+  </cs:chartArea>
+  <cs:dataLabel>
+    <cs:lnRef idx="0"/>
+    <cs:fillRef idx="0"/>
+    <cs:effectRef idx="0"/>
+    <cs:fontRef idx="minor">
+      <a:schemeClr val="tx1">
+        <a:lumMod val="75000"/>
+        <a:lumOff val="25000"/>
+      </a:schemeClr>
+    </cs:fontRef>
+    <cs:defRPr sz="1197" kern="1200"/>
+  </cs:dataLabel>
+  <cs:dataLabelCallout>
+    <cs:lnRef idx="0"/>
+    <cs:fillRef idx="0"/>
+    <cs:effectRef idx="0"/>
+    <cs:fontRef idx="minor">
+      <a:schemeClr val="dk1">
+        <a:lumMod val="65000"/>
+        <a:lumOff val="35000"/>
+      </a:schemeClr>
+    </cs:fontRef>
+    <cs:spPr>
+      <a:solidFill>
+        <a:schemeClr val="lt1"/>
+      </a:solidFill>
+      <a:ln>
+        <a:solidFill>
+          <a:schemeClr val="dk1">
+            <a:lumMod val="25000"/>
+            <a:lumOff val="75000"/>
+          </a:schemeClr>
+        </a:solidFill>
+      </a:ln>
+    </cs:spPr>
+    <cs:defRPr sz="1197" kern="1200"/>
+    <cs:bodyPr rot="0" spcFirstLastPara="1" vertOverflow="clip" horzOverflow="clip" vert="horz" wrap="square" lIns="36576" tIns="18288" rIns="36576" bIns="18288" anchor="ctr" anchorCtr="1">
+      <a:spAutoFit/>
+    </cs:bodyPr>
+  </cs:dataLabelCallout>
+  <cs:dataPoint>
+    <cs:lnRef idx="0"/>
+    <cs:fillRef idx="1">
+      <cs:styleClr val="auto"/>
+    </cs:fillRef>
+    <cs:effectRef idx="0"/>
+    <cs:fontRef idx="minor">
+      <a:schemeClr val="tx1"/>
+    </cs:fontRef>
+  </cs:dataPoint>
+  <cs:dataPoint3D>
+    <cs:lnRef idx="0"/>
+    <cs:fillRef idx="1">
+      <cs:styleClr val="auto"/>
+    </cs:fillRef>
+    <cs:effectRef idx="0"/>
+    <cs:fontRef idx="minor">
+      <a:schemeClr val="tx1"/>
+    </cs:fontRef>
+  </cs:dataPoint3D>
+  <cs:dataPointLine>
+    <cs:lnRef idx="0">
+      <cs:styleClr val="auto"/>
+    </cs:lnRef>
+    <cs:fillRef idx="1"/>
+    <cs:effectRef idx="0"/>
+    <cs:fontRef idx="minor">
+      <a:schemeClr val="tx1"/>
+    </cs:fontRef>
+    <cs:spPr>
+      <a:ln w="28575" cap="rnd">
+        <a:solidFill>
+          <a:schemeClr val="phClr"/>
+        </a:solidFill>
+        <a:round/>
+      </a:ln>
+    </cs:spPr>
+  </cs:dataPointLine>
+  <cs:dataPointMarker>
+    <cs:lnRef idx="0">
+      <cs:styleClr val="auto"/>
+    </cs:lnRef>
+    <cs:fillRef idx="1">
+      <cs:styleClr val="auto"/>
+    </cs:fillRef>
+    <cs:effectRef idx="0"/>
+    <cs:fontRef idx="minor">
+      <a:schemeClr val="tx1"/>
+    </cs:fontRef>
+    <cs:spPr>
+      <a:ln w="9525">
+        <a:solidFill>
+          <a:schemeClr val="phClr"/>
+        </a:solidFill>
+      </a:ln>
+    </cs:spPr>
+  </cs:dataPointMarker>
+  <cs:dataPointMarkerLayout symbol="circle" size="5"/>
+  <cs:dataPointWireframe>
+    <cs:lnRef idx="0">
+      <cs:styleClr val="auto"/>
+    </cs:lnRef>
+    <cs:fillRef idx="1"/>
+    <cs:effectRef idx="0"/>
+    <cs:fontRef idx="minor">
+      <a:schemeClr val="tx1"/>
+    </cs:fontRef>
+    <cs:spPr>
+      <a:ln w="9525" cap="rnd">
+        <a:solidFill>
+          <a:schemeClr val="phClr"/>
+        </a:solidFill>
+        <a:round/>
+      </a:ln>
+    </cs:spPr>
+  </cs:dataPointWireframe>
+  <cs:dataTable>
+    <cs:lnRef idx="0"/>
+    <cs:fillRef idx="0"/>
+    <cs:effectRef idx="0"/>
+    <cs:fontRef idx="minor">
+      <a:schemeClr val="tx1">
+        <a:lumMod val="65000"/>
+        <a:lumOff val="35000"/>
+      </a:schemeClr>
+    </cs:fontRef>
+    <cs:spPr>
+      <a:noFill/>
+      <a:ln w="9525" cap="flat" cmpd="sng" algn="ctr">
+        <a:solidFill>
+          <a:schemeClr val="tx1">
+            <a:lumMod val="15000"/>
+            <a:lumOff val="85000"/>
+          </a:schemeClr>
+        </a:solidFill>
+        <a:round/>
+      </a:ln>
+    </cs:spPr>
+    <cs:defRPr sz="1197" kern="1200"/>
+  </cs:dataTable>
+  <cs:downBar>
+    <cs:lnRef idx="0"/>
+    <cs:fillRef idx="0"/>
+    <cs:effectRef idx="0"/>
+    <cs:fontRef idx="minor">
+      <a:schemeClr val="dk1"/>
+    </cs:fontRef>
+    <cs:spPr>
+      <a:solidFill>
+        <a:schemeClr val="dk1">
+          <a:lumMod val="65000"/>
+          <a:lumOff val="35000"/>
+        </a:schemeClr>
+      </a:solidFill>
+      <a:ln w="9525">
+        <a:solidFill>
+          <a:schemeClr val="tx1">
+            <a:lumMod val="65000"/>
+            <a:lumOff val="35000"/>
+          </a:schemeClr>
+        </a:solidFill>
+      </a:ln>
+    </cs:spPr>
+  </cs:downBar>
+  <cs:dropLine>
+    <cs:lnRef idx="0"/>
+    <cs:fillRef idx="0"/>
+    <cs:effectRef idx="0"/>
+    <cs:fontRef idx="minor">
+      <a:schemeClr val="tx1"/>
+    </cs:fontRef>
+    <cs:spPr>
+      <a:ln w="9525" cap="flat" cmpd="sng" algn="ctr">
+        <a:solidFill>
+          <a:schemeClr val="tx1">
+            <a:lumMod val="35000"/>
+            <a:lumOff val="65000"/>
+          </a:schemeClr>
+        </a:solidFill>
+        <a:round/>
+      </a:ln>
+    </cs:spPr>
+  </cs:dropLine>
+  <cs:errorBar>
+    <cs:lnRef idx="0"/>
+    <cs:fillRef idx="0"/>
+    <cs:effectRef idx="0"/>
+    <cs:fontRef idx="minor">
+      <a:schemeClr val="tx1"/>
+    </cs:fontRef>
+    <cs:spPr>
+      <a:ln w="9525" cap="flat" cmpd="sng" algn="ctr">
+        <a:solidFill>
+          <a:schemeClr val="tx1">
+            <a:lumMod val="65000"/>
+            <a:lumOff val="35000"/>
+          </a:schemeClr>
+        </a:solidFill>
+        <a:round/>
+      </a:ln>
+    </cs:spPr>
+  </cs:errorBar>
+  <cs:floor>
+    <cs:lnRef idx="0"/>
+    <cs:fillRef idx="0"/>
+    <cs:effectRef idx="0"/>
+    <cs:fontRef idx="minor">
+      <a:schemeClr val="tx1"/>
+    </cs:fontRef>
+    <cs:spPr>
+      <a:noFill/>
+      <a:ln>
+        <a:noFill/>
+      </a:ln>
+    </cs:spPr>
+  </cs:floor>
+  <cs:gridlineMajor>
+    <cs:lnRef idx="0"/>
+    <cs:fillRef idx="0"/>
+    <cs:effectRef idx="0"/>
+    <cs:fontRef idx="minor">
+      <a:schemeClr val="tx1"/>
+    </cs:fontRef>
+    <cs:spPr>
+      <a:ln w="9525" cap="flat" cmpd="sng" algn="ctr">
+        <a:solidFill>
+          <a:schemeClr val="tx1">
+            <a:lumMod val="15000"/>
+            <a:lumOff val="85000"/>
+          </a:schemeClr>
+        </a:solidFill>
+        <a:round/>
+      </a:ln>
+    </cs:spPr>
+  </cs:gridlineMajor>
+  <cs:gridlineMinor>
+    <cs:lnRef idx="0"/>
+    <cs:fillRef idx="0"/>
+    <cs:effectRef idx="0"/>
+    <cs:fontRef idx="minor">
+      <a:schemeClr val="tx1"/>
+    </cs:fontRef>
+    <cs:spPr>
+      <a:ln w="9525" cap="flat" cmpd="sng" algn="ctr">
+        <a:solidFill>
+          <a:schemeClr val="tx1">
+            <a:lumMod val="5000"/>
+            <a:lumOff val="95000"/>
+          </a:schemeClr>
+        </a:solidFill>
+        <a:round/>
+      </a:ln>
+    </cs:spPr>
+  </cs:gridlineMinor>
+  <cs:hiLoLine>
+    <cs:lnRef idx="0"/>
+    <cs:fillRef idx="0"/>
+    <cs:effectRef idx="0"/>
+    <cs:fontRef idx="minor">
+      <a:schemeClr val="tx1"/>
+    </cs:fontRef>
+    <cs:spPr>
+      <a:ln w="9525" cap="flat" cmpd="sng" algn="ctr">
+        <a:solidFill>
+          <a:schemeClr val="tx1">
+            <a:lumMod val="75000"/>
+            <a:lumOff val="25000"/>
+          </a:schemeClr>
+        </a:solidFill>
+        <a:round/>
+      </a:ln>
+    </cs:spPr>
+  </cs:hiLoLine>
+  <cs:leaderLine>
+    <cs:lnRef idx="0"/>
+    <cs:fillRef idx="0"/>
+    <cs:effectRef idx="0"/>
+    <cs:fontRef idx="minor">
+      <a:schemeClr val="tx1"/>
+    </cs:fontRef>
+    <cs:spPr>
+      <a:ln w="9525" cap="flat" cmpd="sng" algn="ctr">
+        <a:solidFill>
+          <a:schemeClr val="tx1">
+            <a:lumMod val="35000"/>
+            <a:lumOff val="65000"/>
+          </a:schemeClr>
+        </a:solidFill>
+        <a:round/>
+      </a:ln>
+    </cs:spPr>
+  </cs:leaderLine>
+  <cs:legend>
+    <cs:lnRef idx="0"/>
+    <cs:fillRef idx="0"/>
+    <cs:effectRef idx="0"/>
+    <cs:fontRef idx="minor">
+      <a:schemeClr val="tx1">
+        <a:lumMod val="65000"/>
+        <a:lumOff val="35000"/>
+      </a:schemeClr>
+    </cs:fontRef>
+    <cs:defRPr sz="1197" kern="1200"/>
+  </cs:legend>
+  <cs:plotArea mods="allowNoFillOverride allowNoLineOverride">
+    <cs:lnRef idx="0"/>
+    <cs:fillRef idx="0"/>
+    <cs:effectRef idx="0"/>
+    <cs:fontRef idx="minor">
+      <a:schemeClr val="tx1"/>
+    </cs:fontRef>
+  </cs:plotArea>
+  <cs:plotArea3D mods="allowNoFillOverride allowNoLineOverride">
+    <cs:lnRef idx="0"/>
+    <cs:fillRef idx="0"/>
+    <cs:effectRef idx="0"/>
+    <cs:fontRef idx="minor">
+      <a:schemeClr val="tx1"/>
+    </cs:fontRef>
+  </cs:plotArea3D>
+  <cs:seriesAxis>
+    <cs:lnRef idx="0"/>
+    <cs:fillRef idx="0"/>
+    <cs:effectRef idx="0"/>
+    <cs:fontRef idx="minor">
+      <a:schemeClr val="tx1">
+        <a:lumMod val="65000"/>
+        <a:lumOff val="35000"/>
+      </a:schemeClr>
+    </cs:fontRef>
+    <cs:defRPr sz="1197" kern="1200"/>
+  </cs:seriesAxis>
+  <cs:seriesLine>
+    <cs:lnRef idx="0"/>
+    <cs:fillRef idx="0"/>
+    <cs:effectRef idx="0"/>
+    <cs:fontRef idx="minor">
+      <a:schemeClr val="tx1"/>
+    </cs:fontRef>
+    <cs:spPr>
+      <a:ln w="9525" cap="flat" cmpd="sng" algn="ctr">
+        <a:solidFill>
+          <a:schemeClr val="tx1">
+            <a:lumMod val="35000"/>
+            <a:lumOff val="65000"/>
+          </a:schemeClr>
+        </a:solidFill>
+        <a:round/>
+      </a:ln>
+    </cs:spPr>
+  </cs:seriesLine>
+  <cs:title>
+    <cs:lnRef idx="0"/>
+    <cs:fillRef idx="0"/>
+    <cs:effectRef idx="0"/>
+    <cs:fontRef idx="minor">
+      <a:schemeClr val="tx1">
+        <a:lumMod val="65000"/>
+        <a:lumOff val="35000"/>
+      </a:schemeClr>
+    </cs:fontRef>
+    <cs:defRPr sz="1862" b="0" kern="1200" spc="0" baseline="0"/>
+  </cs:title>
+  <cs:trendline>
+    <cs:lnRef idx="0">
+      <cs:styleClr val="auto"/>
+    </cs:lnRef>
+    <cs:fillRef idx="0"/>
+    <cs:effectRef idx="0"/>
+    <cs:fontRef idx="minor">
+      <a:schemeClr val="tx1"/>
+    </cs:fontRef>
+    <cs:spPr>
+      <a:ln w="19050" cap="rnd">
+        <a:solidFill>
+          <a:schemeClr val="phClr"/>
+        </a:solidFill>
+        <a:prstDash val="sysDot"/>
+      </a:ln>
+    </cs:spPr>
+  </cs:trendline>
+  <cs:trendlineLabel>
+    <cs:lnRef idx="0"/>
+    <cs:fillRef idx="0"/>
+    <cs:effectRef idx="0"/>
+    <cs:fontRef idx="minor">
+      <a:schemeClr val="tx1">
+        <a:lumMod val="65000"/>
+        <a:lumOff val="35000"/>
+      </a:schemeClr>
+    </cs:fontRef>
+    <cs:defRPr sz="1197" kern="1200"/>
+  </cs:trendlineLabel>
+  <cs:upBar>
+    <cs:lnRef idx="0"/>
+    <cs:fillRef idx="0"/>
+    <cs:effectRef idx="0"/>
+    <cs:fontRef idx="minor">
+      <a:schemeClr val="dk1"/>
+    </cs:fontRef>
+    <cs:spPr>
+      <a:solidFill>
+        <a:schemeClr val="lt1"/>
+      </a:solidFill>
+      <a:ln w="9525">
+        <a:solidFill>
+          <a:schemeClr val="tx1">
+            <a:lumMod val="15000"/>
+            <a:lumOff val="85000"/>
+          </a:schemeClr>
+        </a:solidFill>
+      </a:ln>
+    </cs:spPr>
+  </cs:upBar>
+  <cs:valueAxis>
+    <cs:lnRef idx="0"/>
+    <cs:fillRef idx="0"/>
+    <cs:effectRef idx="0"/>
+    <cs:fontRef idx="minor">
+      <a:schemeClr val="tx1">
+        <a:lumMod val="65000"/>
+        <a:lumOff val="35000"/>
+      </a:schemeClr>
+    </cs:fontRef>
+    <cs:defRPr sz="1197" kern="1200"/>
+  </cs:valueAxis>
+  <cs:wall>
+    <cs:lnRef idx="0"/>
+    <cs:fillRef idx="0"/>
+    <cs:effectRef idx="0"/>
+    <cs:fontRef idx="minor">
+      <a:schemeClr val="tx1"/>
+    </cs:fontRef>
+    <cs:spPr>
+      <a:noFill/>
+      <a:ln>
+        <a:noFill/>
+      </a:ln>
+    </cs:spPr>
+  </cs:wall>
+</cs:chartStyle>
+</file>
+
+<file path=ppt/charts/style7.xml><?xml version="1.0" encoding="utf-8"?>
+<cs:chartStyle xmlns:cs="http://schemas.microsoft.com/office/drawing/2012/chartStyle" xmlns:a="http://schemas.openxmlformats.org/drawingml/2006/main" id="251">
+  <cs:axisTitle>
+    <cs:lnRef idx="0"/>
+    <cs:fillRef idx="0"/>
+    <cs:effectRef idx="0"/>
+    <cs:fontRef idx="minor">
+      <a:schemeClr val="tx1">
+        <a:lumMod val="65000"/>
+        <a:lumOff val="35000"/>
+      </a:schemeClr>
+    </cs:fontRef>
+    <cs:defRPr sz="1330" kern="1200"/>
+  </cs:axisTitle>
+  <cs:categoryAxis>
+    <cs:lnRef idx="0"/>
+    <cs:fillRef idx="0"/>
+    <cs:effectRef idx="0"/>
+    <cs:fontRef idx="minor">
+      <a:schemeClr val="tx1">
+        <a:lumMod val="65000"/>
+        <a:lumOff val="35000"/>
+      </a:schemeClr>
+    </cs:fontRef>
+    <cs:spPr>
+      <a:ln w="9525" cap="flat" cmpd="sng" algn="ctr">
+        <a:solidFill>
+          <a:schemeClr val="tx1">
+            <a:lumMod val="15000"/>
+            <a:lumOff val="85000"/>
+          </a:schemeClr>
+        </a:solidFill>
+        <a:round/>
+      </a:ln>
+    </cs:spPr>
+    <cs:defRPr sz="1197" kern="1200"/>
+  </cs:categoryAxis>
+  <cs:chartArea mods="allowNoFillOverride allowNoLineOverride">
+    <cs:lnRef idx="0"/>
+    <cs:fillRef idx="0"/>
+    <cs:effectRef idx="0"/>
+    <cs:fontRef idx="minor">
+      <a:schemeClr val="tx1"/>
+    </cs:fontRef>
+    <cs:spPr>
+      <a:solidFill>
+        <a:schemeClr val="bg1"/>
+      </a:solidFill>
+      <a:ln w="9525" cap="flat" cmpd="sng" algn="ctr">
+        <a:solidFill>
+          <a:schemeClr val="tx1">
+            <a:lumMod val="15000"/>
+            <a:lumOff val="85000"/>
+          </a:schemeClr>
+        </a:solidFill>
+        <a:round/>
+      </a:ln>
+    </cs:spPr>
+    <cs:defRPr sz="1197" kern="1200"/>
+  </cs:chartArea>
+  <cs:dataLabel>
+    <cs:lnRef idx="0"/>
+    <cs:fillRef idx="0"/>
+    <cs:effectRef idx="0"/>
+    <cs:fontRef idx="minor">
+      <a:schemeClr val="tx1">
+        <a:lumMod val="75000"/>
+        <a:lumOff val="25000"/>
+      </a:schemeClr>
+    </cs:fontRef>
+    <cs:defRPr sz="1197" kern="1200"/>
+  </cs:dataLabel>
+  <cs:dataLabelCallout>
+    <cs:lnRef idx="0"/>
+    <cs:fillRef idx="0"/>
+    <cs:effectRef idx="0"/>
+    <cs:fontRef idx="minor">
+      <a:schemeClr val="dk1">
+        <a:lumMod val="65000"/>
+        <a:lumOff val="35000"/>
+      </a:schemeClr>
+    </cs:fontRef>
+    <cs:spPr>
+      <a:solidFill>
+        <a:schemeClr val="lt1"/>
+      </a:solidFill>
+      <a:ln>
+        <a:solidFill>
+          <a:schemeClr val="dk1">
+            <a:lumMod val="25000"/>
+            <a:lumOff val="75000"/>
+          </a:schemeClr>
+        </a:solidFill>
+      </a:ln>
+    </cs:spPr>
+    <cs:defRPr sz="1197" kern="1200"/>
+    <cs:bodyPr rot="0" spcFirstLastPara="1" vertOverflow="clip" horzOverflow="clip" vert="horz" wrap="square" lIns="36576" tIns="18288" rIns="36576" bIns="18288" anchor="ctr" anchorCtr="1">
+      <a:spAutoFit/>
+    </cs:bodyPr>
+  </cs:dataLabelCallout>
+  <cs:dataPoint>
+    <cs:lnRef idx="0"/>
+    <cs:fillRef idx="1">
+      <cs:styleClr val="auto"/>
+    </cs:fillRef>
+    <cs:effectRef idx="0"/>
+    <cs:fontRef idx="minor">
+      <a:schemeClr val="tx1"/>
+    </cs:fontRef>
+    <cs:spPr>
+      <a:ln w="19050">
+        <a:solidFill>
+          <a:schemeClr val="lt1"/>
+        </a:solidFill>
+      </a:ln>
+    </cs:spPr>
+  </cs:dataPoint>
+  <cs:dataPoint3D>
+    <cs:lnRef idx="0"/>
+    <cs:fillRef idx="1">
+      <cs:styleClr val="auto"/>
+    </cs:fillRef>
+    <cs:effectRef idx="0"/>
+    <cs:fontRef idx="minor">
+      <a:schemeClr val="tx1"/>
+    </cs:fontRef>
+    <cs:spPr>
+      <a:ln w="25400">
+        <a:solidFill>
+          <a:schemeClr val="lt1"/>
+        </a:solidFill>
+      </a:ln>
+    </cs:spPr>
+  </cs:dataPoint3D>
+  <cs:dataPointLine>
+    <cs:lnRef idx="0">
+      <cs:styleClr val="auto"/>
+    </cs:lnRef>
+    <cs:fillRef idx="0"/>
+    <cs:effectRef idx="0"/>
+    <cs:fontRef idx="minor">
+      <a:schemeClr val="tx1"/>
+    </cs:fontRef>
+    <cs:spPr>
+      <a:ln w="28575" cap="rnd">
+        <a:solidFill>
+          <a:schemeClr val="phClr"/>
+        </a:solidFill>
+        <a:round/>
+      </a:ln>
+    </cs:spPr>
+  </cs:dataPointLine>
+  <cs:dataPointMarker>
+    <cs:lnRef idx="0">
+      <cs:styleClr val="auto"/>
+    </cs:lnRef>
+    <cs:fillRef idx="1">
+      <cs:styleClr val="auto"/>
+    </cs:fillRef>
+    <cs:effectRef idx="0"/>
+    <cs:fontRef idx="minor">
+      <a:schemeClr val="tx1"/>
+    </cs:fontRef>
+    <cs:spPr>
+      <a:ln w="9525">
+        <a:solidFill>
+          <a:schemeClr val="phClr"/>
+        </a:solidFill>
+      </a:ln>
+    </cs:spPr>
+  </cs:dataPointMarker>
+  <cs:dataPointMarkerLayout symbol="circle" size="5"/>
+  <cs:dataPointWireframe>
+    <cs:lnRef idx="0">
+      <cs:styleClr val="auto"/>
+    </cs:lnRef>
+    <cs:fillRef idx="0"/>
+    <cs:effectRef idx="0"/>
+    <cs:fontRef idx="minor">
+      <a:schemeClr val="tx1"/>
+    </cs:fontRef>
+    <cs:spPr>
+      <a:ln w="9525" cap="rnd">
+        <a:solidFill>
+          <a:schemeClr val="phClr"/>
+        </a:solidFill>
+        <a:round/>
+      </a:ln>
+    </cs:spPr>
+  </cs:dataPointWireframe>
+  <cs:dataTable>
+    <cs:lnRef idx="0"/>
+    <cs:fillRef idx="0"/>
+    <cs:effectRef idx="0"/>
+    <cs:fontRef idx="minor">
+      <a:schemeClr val="tx1">
+        <a:lumMod val="65000"/>
+        <a:lumOff val="35000"/>
+      </a:schemeClr>
+    </cs:fontRef>
+    <cs:spPr>
+      <a:noFill/>
+      <a:ln w="9525" cap="flat" cmpd="sng" algn="ctr">
+        <a:solidFill>
+          <a:schemeClr val="tx1">
+            <a:lumMod val="15000"/>
+            <a:lumOff val="85000"/>
+          </a:schemeClr>
+        </a:solidFill>
+        <a:round/>
+      </a:ln>
+    </cs:spPr>
+    <cs:defRPr sz="1197" kern="1200"/>
+  </cs:dataTable>
+  <cs:downBar>
+    <cs:lnRef idx="0"/>
+    <cs:fillRef idx="0"/>
+    <cs:effectRef idx="0"/>
+    <cs:fontRef idx="minor">
+      <a:schemeClr val="tx1"/>
+    </cs:fontRef>
+    <cs:spPr>
+      <a:solidFill>
+        <a:schemeClr val="dk1">
+          <a:lumMod val="75000"/>
+          <a:lumOff val="25000"/>
+        </a:schemeClr>
+      </a:solidFill>
+      <a:ln w="9525" cap="flat" cmpd="sng" algn="ctr">
+        <a:solidFill>
+          <a:schemeClr val="tx1">
+            <a:lumMod val="65000"/>
+            <a:lumOff val="35000"/>
+          </a:schemeClr>
+        </a:solidFill>
+        <a:round/>
+      </a:ln>
+    </cs:spPr>
+  </cs:downBar>
+  <cs:dropLine>
+    <cs:lnRef idx="0"/>
+    <cs:fillRef idx="0"/>
+    <cs:effectRef idx="0"/>
+    <cs:fontRef idx="minor">
+      <a:schemeClr val="tx1"/>
+    </cs:fontRef>
+    <cs:spPr>
+      <a:ln w="9525" cap="flat" cmpd="sng" algn="ctr">
+        <a:solidFill>
+          <a:schemeClr val="tx1">
+            <a:lumMod val="35000"/>
+            <a:lumOff val="65000"/>
+          </a:schemeClr>
+        </a:solidFill>
+        <a:round/>
+      </a:ln>
+    </cs:spPr>
+  </cs:dropLine>
+  <cs:errorBar>
+    <cs:lnRef idx="0"/>
+    <cs:fillRef idx="0"/>
+    <cs:effectRef idx="0"/>
+    <cs:fontRef idx="minor">
+      <a:schemeClr val="tx1"/>
+    </cs:fontRef>
+    <cs:spPr>
+      <a:ln w="9525" cap="flat" cmpd="sng" algn="ctr">
+        <a:solidFill>
+          <a:schemeClr val="tx1">
+            <a:lumMod val="65000"/>
+            <a:lumOff val="35000"/>
+          </a:schemeClr>
+        </a:solidFill>
+        <a:round/>
+      </a:ln>
+    </cs:spPr>
+  </cs:errorBar>
+  <cs:floor>
+    <cs:lnRef idx="0"/>
+    <cs:fillRef idx="0"/>
+    <cs:effectRef idx="0"/>
+    <cs:fontRef idx="minor">
+      <a:schemeClr val="tx1"/>
+    </cs:fontRef>
+    <cs:spPr>
+      <a:noFill/>
+      <a:ln>
+        <a:noFill/>
+      </a:ln>
+    </cs:spPr>
+  </cs:floor>
+  <cs:gridlineMajor>
+    <cs:lnRef idx="0"/>
+    <cs:fillRef idx="0"/>
+    <cs:effectRef idx="0"/>
+    <cs:fontRef idx="minor">
+      <a:schemeClr val="tx1"/>
+    </cs:fontRef>
+    <cs:spPr>
+      <a:ln w="9525" cap="flat" cmpd="sng" algn="ctr">
+        <a:solidFill>
+          <a:schemeClr val="tx1">
+            <a:lumMod val="15000"/>
+            <a:lumOff val="85000"/>
+          </a:schemeClr>
+        </a:solidFill>
+        <a:round/>
+      </a:ln>
+    </cs:spPr>
+  </cs:gridlineMajor>
+  <cs:gridlineMinor>
+    <cs:lnRef idx="0"/>
+    <cs:fillRef idx="0"/>
+    <cs:effectRef idx="0"/>
+    <cs:fontRef idx="minor">
+      <a:schemeClr val="tx1"/>
+    </cs:fontRef>
+    <cs:spPr>
+      <a:ln w="9525" cap="flat" cmpd="sng" algn="ctr">
+        <a:solidFill>
+          <a:schemeClr val="tx1">
+            <a:lumMod val="5000"/>
+            <a:lumOff val="95000"/>
+          </a:schemeClr>
+        </a:solidFill>
+        <a:round/>
+      </a:ln>
+    </cs:spPr>
+  </cs:gridlineMinor>
+  <cs:hiLoLine>
+    <cs:lnRef idx="0"/>
+    <cs:fillRef idx="0"/>
+    <cs:effectRef idx="0"/>
+    <cs:fontRef idx="minor">
+      <a:schemeClr val="tx1"/>
+    </cs:fontRef>
+    <cs:spPr>
+      <a:ln w="9525" cap="flat" cmpd="sng" algn="ctr">
+        <a:solidFill>
+          <a:schemeClr val="tx1">
+            <a:lumMod val="50000"/>
+            <a:lumOff val="50000"/>
+          </a:schemeClr>
+        </a:solidFill>
+        <a:round/>
+      </a:ln>
+    </cs:spPr>
+  </cs:hiLoLine>
+  <cs:leaderLine>
+    <cs:lnRef idx="0"/>
+    <cs:fillRef idx="0"/>
+    <cs:effectRef idx="0"/>
+    <cs:fontRef idx="minor">
+      <a:schemeClr val="tx1"/>
+    </cs:fontRef>
+    <cs:spPr>
+      <a:ln w="9525" cap="flat" cmpd="sng" algn="ctr">
+        <a:solidFill>
+          <a:schemeClr val="tx1">
+            <a:lumMod val="35000"/>
+            <a:lumOff val="65000"/>
+          </a:schemeClr>
+        </a:solidFill>
+        <a:round/>
+      </a:ln>
+    </cs:spPr>
+  </cs:leaderLine>
+  <cs:legend>
+    <cs:lnRef idx="0"/>
+    <cs:fillRef idx="0"/>
+    <cs:effectRef idx="0"/>
+    <cs:fontRef idx="minor">
+      <a:schemeClr val="tx1">
+        <a:lumMod val="65000"/>
+        <a:lumOff val="35000"/>
+      </a:schemeClr>
+    </cs:fontRef>
+    <cs:defRPr sz="1197" kern="1200"/>
+  </cs:legend>
+  <cs:plotArea mods="allowNoFillOverride allowNoLineOverride">
+    <cs:lnRef idx="0"/>
+    <cs:fillRef idx="0"/>
+    <cs:effectRef idx="0"/>
+    <cs:fontRef idx="minor">
+      <a:schemeClr val="tx1"/>
+    </cs:fontRef>
+  </cs:plotArea>
+  <cs:plotArea3D mods="allowNoFillOverride allowNoLineOverride">
+    <cs:lnRef idx="0"/>
+    <cs:fillRef idx="0"/>
+    <cs:effectRef idx="0"/>
+    <cs:fontRef idx="minor">
+      <a:schemeClr val="tx1"/>
+    </cs:fontRef>
+  </cs:plotArea3D>
+  <cs:seriesAxis>
+    <cs:lnRef idx="0"/>
+    <cs:fillRef idx="0"/>
+    <cs:effectRef idx="0"/>
+    <cs:fontRef idx="minor">
+      <a:schemeClr val="tx1">
+        <a:lumMod val="65000"/>
+        <a:lumOff val="35000"/>
+      </a:schemeClr>
+    </cs:fontRef>
+    <cs:defRPr sz="1197" kern="1200"/>
+  </cs:seriesAxis>
+  <cs:seriesLine>
+    <cs:lnRef idx="0"/>
+    <cs:fillRef idx="0"/>
+    <cs:effectRef idx="0"/>
+    <cs:fontRef idx="minor">
+      <a:schemeClr val="tx1"/>
+    </cs:fontRef>
+    <cs:spPr>
+      <a:ln w="9525" cap="flat" cmpd="sng" algn="ctr">
+        <a:solidFill>
+          <a:schemeClr val="tx1">
+            <a:lumMod val="35000"/>
+            <a:lumOff val="65000"/>
+          </a:schemeClr>
+        </a:solidFill>
+        <a:round/>
+      </a:ln>
+    </cs:spPr>
+  </cs:seriesLine>
+  <cs:title>
+    <cs:lnRef idx="0"/>
+    <cs:fillRef idx="0"/>
+    <cs:effectRef idx="0"/>
+    <cs:fontRef idx="minor">
+      <a:schemeClr val="tx1">
+        <a:lumMod val="65000"/>
+        <a:lumOff val="35000"/>
+      </a:schemeClr>
+    </cs:fontRef>
+    <cs:defRPr sz="1862" b="0" kern="1200" spc="0" baseline="0"/>
+  </cs:title>
+  <cs:trendline>
+    <cs:lnRef idx="0">
+      <cs:styleClr val="auto"/>
+    </cs:lnRef>
+    <cs:fillRef idx="0"/>
+    <cs:effectRef idx="0"/>
+    <cs:fontRef idx="minor">
+      <a:schemeClr val="tx1"/>
+    </cs:fontRef>
+    <cs:spPr>
+      <a:ln w="19050" cap="rnd">
+        <a:solidFill>
+          <a:schemeClr val="phClr"/>
+        </a:solidFill>
+        <a:prstDash val="sysDot"/>
+      </a:ln>
+    </cs:spPr>
+  </cs:trendline>
+  <cs:trendlineLabel>
+    <cs:lnRef idx="0"/>
+    <cs:fillRef idx="0"/>
+    <cs:effectRef idx="0"/>
+    <cs:fontRef idx="minor">
+      <a:schemeClr val="tx1">
+        <a:lumMod val="65000"/>
+        <a:lumOff val="35000"/>
+      </a:schemeClr>
+    </cs:fontRef>
+    <cs:defRPr sz="1197" kern="1200"/>
+  </cs:trendlineLabel>
+  <cs:upBar>
+    <cs:lnRef idx="0"/>
+    <cs:fillRef idx="0"/>
+    <cs:effectRef idx="0"/>
+    <cs:fontRef idx="minor">
+      <a:schemeClr val="tx1"/>
+    </cs:fontRef>
+    <cs:spPr>
+      <a:solidFill>
+        <a:schemeClr val="lt1"/>
+      </a:solidFill>
+      <a:ln w="9525" cap="flat" cmpd="sng" algn="ctr">
+        <a:solidFill>
+          <a:schemeClr val="tx1">
+            <a:lumMod val="65000"/>
+            <a:lumOff val="35000"/>
+          </a:schemeClr>
+        </a:solidFill>
+        <a:round/>
+      </a:ln>
+    </cs:spPr>
+  </cs:upBar>
+  <cs:valueAxis>
+    <cs:lnRef idx="0"/>
+    <cs:fillRef idx="0"/>
+    <cs:effectRef idx="0"/>
+    <cs:fontRef idx="minor">
+      <a:schemeClr val="tx1">
+        <a:lumMod val="65000"/>
+        <a:lumOff val="35000"/>
+      </a:schemeClr>
+    </cs:fontRef>
+    <cs:defRPr sz="1197" kern="1200"/>
+  </cs:valueAxis>
+  <cs:wall>
+    <cs:lnRef idx="0"/>
+    <cs:fillRef idx="0"/>
+    <cs:effectRef idx="0"/>
+    <cs:fontRef idx="minor">
+      <a:schemeClr val="tx1"/>
+    </cs:fontRef>
+    <cs:spPr>
+      <a:noFill/>
+      <a:ln>
+        <a:noFill/>
+      </a:ln>
+    </cs:spPr>
+  </cs:wall>
+</cs:chartStyle>
+</file>
+
+<file path=ppt/charts/style8.xml><?xml version="1.0" encoding="utf-8"?>
+<cs:chartStyle xmlns:cs="http://schemas.microsoft.com/office/drawing/2012/chartStyle" xmlns:a="http://schemas.openxmlformats.org/drawingml/2006/main" id="227">
+  <cs:axisTitle>
+    <cs:lnRef idx="0"/>
+    <cs:fillRef idx="0"/>
+    <cs:effectRef idx="0"/>
+    <cs:fontRef idx="minor">
+      <a:schemeClr val="tx1">
+        <a:lumMod val="65000"/>
+        <a:lumOff val="35000"/>
+      </a:schemeClr>
+    </cs:fontRef>
+    <cs:defRPr sz="1000" kern="1200"/>
+  </cs:axisTitle>
+  <cs:categoryAxis>
+    <cs:lnRef idx="0"/>
+    <cs:fillRef idx="0"/>
+    <cs:effectRef idx="0"/>
+    <cs:fontRef idx="minor">
+      <a:schemeClr val="tx1">
+        <a:lumMod val="65000"/>
+        <a:lumOff val="35000"/>
+      </a:schemeClr>
+    </cs:fontRef>
+    <cs:spPr>
+      <a:ln w="9525" cap="flat" cmpd="sng" algn="ctr">
+        <a:solidFill>
+          <a:schemeClr val="tx1">
+            <a:lumMod val="15000"/>
+            <a:lumOff val="85000"/>
+          </a:schemeClr>
+        </a:solidFill>
+        <a:round/>
+      </a:ln>
+    </cs:spPr>
+    <cs:defRPr sz="900" kern="1200"/>
+  </cs:categoryAxis>
+  <cs:chartArea mods="allowNoFillOverride allowNoLineOverride">
+    <cs:lnRef idx="0"/>
+    <cs:fillRef idx="0"/>
+    <cs:effectRef idx="0"/>
+    <cs:fontRef idx="minor">
+      <a:schemeClr val="tx1"/>
+    </cs:fontRef>
+    <cs:spPr>
+      <a:solidFill>
+        <a:schemeClr val="bg1"/>
+      </a:solidFill>
+      <a:ln w="9525" cap="flat" cmpd="sng" algn="ctr">
+        <a:solidFill>
+          <a:schemeClr val="tx1">
+            <a:lumMod val="15000"/>
+            <a:lumOff val="85000"/>
+          </a:schemeClr>
+        </a:solidFill>
+        <a:round/>
+      </a:ln>
+    </cs:spPr>
+    <cs:defRPr sz="1000" kern="1200"/>
+  </cs:chartArea>
+  <cs:dataLabel>
+    <cs:lnRef idx="0"/>
+    <cs:fillRef idx="0"/>
+    <cs:effectRef idx="0"/>
+    <cs:fontRef idx="minor">
+      <a:schemeClr val="tx1">
+        <a:lumMod val="75000"/>
+        <a:lumOff val="25000"/>
+      </a:schemeClr>
+    </cs:fontRef>
+    <cs:defRPr sz="900" kern="1200"/>
+  </cs:dataLabel>
+  <cs:dataLabelCallout>
+    <cs:lnRef idx="0"/>
+    <cs:fillRef idx="0"/>
+    <cs:effectRef idx="0"/>
+    <cs:fontRef idx="minor">
+      <a:schemeClr val="dk1">
+        <a:lumMod val="65000"/>
+        <a:lumOff val="35000"/>
+      </a:schemeClr>
+    </cs:fontRef>
+    <cs:spPr>
+      <a:solidFill>
+        <a:schemeClr val="lt1"/>
+      </a:solidFill>
+      <a:ln>
+        <a:solidFill>
+          <a:schemeClr val="dk1">
+            <a:lumMod val="25000"/>
+            <a:lumOff val="75000"/>
+          </a:schemeClr>
+        </a:solidFill>
+      </a:ln>
+    </cs:spPr>
+    <cs:defRPr sz="900" kern="1200"/>
+    <cs:bodyPr rot="0" spcFirstLastPara="1" vertOverflow="clip" horzOverflow="clip" vert="horz" wrap="square" lIns="36576" tIns="18288" rIns="36576" bIns="18288" anchor="ctr" anchorCtr="1">
+      <a:spAutoFit/>
+    </cs:bodyPr>
+  </cs:dataLabelCallout>
+  <cs:dataPoint>
+    <cs:lnRef idx="0"/>
+    <cs:fillRef idx="1">
+      <cs:styleClr val="auto"/>
+    </cs:fillRef>
+    <cs:effectRef idx="0"/>
+    <cs:fontRef idx="minor">
+      <a:schemeClr val="tx1"/>
+    </cs:fontRef>
+    <cs:spPr>
+      <a:solidFill>
+        <a:schemeClr val="phClr"/>
+      </a:solidFill>
+    </cs:spPr>
+  </cs:dataPoint>
+  <cs:dataPoint3D>
+    <cs:lnRef idx="0"/>
+    <cs:fillRef idx="1">
+      <cs:styleClr val="auto"/>
+    </cs:fillRef>
+    <cs:effectRef idx="0"/>
+    <cs:fontRef idx="minor">
+      <a:schemeClr val="tx1"/>
+    </cs:fontRef>
+    <cs:spPr>
+      <a:solidFill>
+        <a:schemeClr val="phClr"/>
+      </a:solidFill>
+    </cs:spPr>
+  </cs:dataPoint3D>
+  <cs:dataPointLine>
+    <cs:lnRef idx="0">
+      <cs:styleClr val="auto"/>
+    </cs:lnRef>
+    <cs:fillRef idx="1"/>
+    <cs:effectRef idx="0"/>
+    <cs:fontRef idx="minor">
+      <a:schemeClr val="tx1"/>
+    </cs:fontRef>
+    <cs:spPr>
+      <a:ln w="28575" cap="rnd">
+        <a:solidFill>
+          <a:schemeClr val="phClr"/>
+        </a:solidFill>
+        <a:round/>
+      </a:ln>
+    </cs:spPr>
+  </cs:dataPointLine>
+  <cs:dataPointMarker>
+    <cs:lnRef idx="0">
+      <cs:styleClr val="auto"/>
+    </cs:lnRef>
+    <cs:fillRef idx="1">
+      <cs:styleClr val="auto"/>
+    </cs:fillRef>
+    <cs:effectRef idx="0"/>
+    <cs:fontRef idx="minor">
+      <a:schemeClr val="tx1"/>
+    </cs:fontRef>
+    <cs:spPr>
+      <a:solidFill>
+        <a:schemeClr val="phClr"/>
+      </a:solidFill>
+      <a:ln w="9525">
+        <a:solidFill>
+          <a:schemeClr val="phClr"/>
+        </a:solidFill>
+      </a:ln>
+    </cs:spPr>
+  </cs:dataPointMarker>
+  <cs:dataPointMarkerLayout symbol="circle" size="5"/>
+  <cs:dataPointWireframe>
+    <cs:lnRef idx="0">
+      <cs:styleClr val="auto"/>
+    </cs:lnRef>
+    <cs:fillRef idx="1"/>
+    <cs:effectRef idx="0"/>
+    <cs:fontRef idx="minor">
+      <a:schemeClr val="tx1"/>
+    </cs:fontRef>
+    <cs:spPr>
+      <a:ln w="9525" cap="rnd">
+        <a:solidFill>
+          <a:schemeClr val="phClr"/>
+        </a:solidFill>
+        <a:round/>
+      </a:ln>
+    </cs:spPr>
+  </cs:dataPointWireframe>
+  <cs:dataTable>
+    <cs:lnRef idx="0"/>
+    <cs:fillRef idx="0"/>
+    <cs:effectRef idx="0"/>
+    <cs:fontRef idx="minor">
+      <a:schemeClr val="tx1">
+        <a:lumMod val="65000"/>
+        <a:lumOff val="35000"/>
+      </a:schemeClr>
+    </cs:fontRef>
+    <cs:spPr>
+      <a:noFill/>
+      <a:ln w="9525" cap="flat" cmpd="sng" algn="ctr">
+        <a:solidFill>
+          <a:schemeClr val="tx1">
+            <a:lumMod val="15000"/>
+            <a:lumOff val="85000"/>
+          </a:schemeClr>
+        </a:solidFill>
+        <a:round/>
+      </a:ln>
+    </cs:spPr>
+    <cs:defRPr sz="900" kern="1200"/>
+  </cs:dataTable>
+  <cs:downBar>
+    <cs:lnRef idx="0"/>
+    <cs:fillRef idx="0"/>
+    <cs:effectRef idx="0"/>
+    <cs:fontRef idx="minor">
+      <a:schemeClr val="dk1"/>
+    </cs:fontRef>
+    <cs:spPr>
+      <a:solidFill>
+        <a:schemeClr val="dk1">
+          <a:lumMod val="65000"/>
+          <a:lumOff val="35000"/>
+        </a:schemeClr>
+      </a:solidFill>
+      <a:ln w="9525">
+        <a:solidFill>
+          <a:schemeClr val="tx1">
+            <a:lumMod val="65000"/>
+            <a:lumOff val="35000"/>
+          </a:schemeClr>
+        </a:solidFill>
+      </a:ln>
+    </cs:spPr>
+  </cs:downBar>
+  <cs:dropLine>
+    <cs:lnRef idx="0"/>
+    <cs:fillRef idx="0"/>
+    <cs:effectRef idx="0"/>
+    <cs:fontRef idx="minor">
+      <a:schemeClr val="tx1"/>
+    </cs:fontRef>
+    <cs:spPr>
+      <a:ln w="9525" cap="flat" cmpd="sng" algn="ctr">
+        <a:solidFill>
+          <a:schemeClr val="tx1">
+            <a:lumMod val="35000"/>
+            <a:lumOff val="65000"/>
+          </a:schemeClr>
+        </a:solidFill>
+        <a:round/>
+      </a:ln>
+    </cs:spPr>
+  </cs:dropLine>
+  <cs:errorBar>
+    <cs:lnRef idx="0"/>
+    <cs:fillRef idx="0"/>
+    <cs:effectRef idx="0"/>
+    <cs:fontRef idx="minor">
+      <a:schemeClr val="tx1"/>
+    </cs:fontRef>
+    <cs:spPr>
+      <a:ln w="9525" cap="flat" cmpd="sng" algn="ctr">
+        <a:solidFill>
+          <a:schemeClr val="tx1">
+            <a:lumMod val="65000"/>
+            <a:lumOff val="35000"/>
+          </a:schemeClr>
+        </a:solidFill>
+        <a:round/>
+      </a:ln>
+    </cs:spPr>
+  </cs:errorBar>
+  <cs:floor>
+    <cs:lnRef idx="0"/>
+    <cs:fillRef idx="0"/>
+    <cs:effectRef idx="0"/>
+    <cs:fontRef idx="minor">
+      <a:schemeClr val="tx1"/>
+    </cs:fontRef>
+    <cs:spPr>
+      <a:noFill/>
+      <a:ln>
+        <a:noFill/>
+      </a:ln>
+    </cs:spPr>
+  </cs:floor>
+  <cs:gridlineMajor>
+    <cs:lnRef idx="0"/>
+    <cs:fillRef idx="0"/>
+    <cs:effectRef idx="0"/>
+    <cs:fontRef idx="minor">
+      <a:schemeClr val="tx1"/>
+    </cs:fontRef>
+    <cs:spPr>
+      <a:ln w="9525" cap="flat" cmpd="sng" algn="ctr">
+        <a:solidFill>
+          <a:schemeClr val="tx1">
+            <a:lumMod val="15000"/>
+            <a:lumOff val="85000"/>
+          </a:schemeClr>
+        </a:solidFill>
+        <a:round/>
+      </a:ln>
+    </cs:spPr>
+  </cs:gridlineMajor>
+  <cs:gridlineMinor>
+    <cs:lnRef idx="0"/>
+    <cs:fillRef idx="0"/>
+    <cs:effectRef idx="0"/>
+    <cs:fontRef idx="minor">
+      <a:schemeClr val="tx1"/>
+    </cs:fontRef>
+    <cs:spPr>
+      <a:ln w="9525" cap="flat" cmpd="sng" algn="ctr">
+        <a:solidFill>
+          <a:schemeClr val="tx1">
+            <a:lumMod val="5000"/>
+            <a:lumOff val="95000"/>
+          </a:schemeClr>
+        </a:solidFill>
+        <a:round/>
+      </a:ln>
+    </cs:spPr>
+  </cs:gridlineMinor>
+  <cs:hiLoLine>
+    <cs:lnRef idx="0"/>
+    <cs:fillRef idx="0"/>
+    <cs:effectRef idx="0"/>
+    <cs:fontRef idx="minor">
+      <a:schemeClr val="tx1"/>
+    </cs:fontRef>
+    <cs:spPr>
+      <a:ln w="9525" cap="flat" cmpd="sng" algn="ctr">
+        <a:solidFill>
+          <a:schemeClr val="tx1">
+            <a:lumMod val="75000"/>
+            <a:lumOff val="25000"/>
+          </a:schemeClr>
+        </a:solidFill>
+        <a:round/>
+      </a:ln>
+    </cs:spPr>
+  </cs:hiLoLine>
+  <cs:leaderLine>
+    <cs:lnRef idx="0"/>
+    <cs:fillRef idx="0"/>
+    <cs:effectRef idx="0"/>
+    <cs:fontRef idx="minor">
+      <a:schemeClr val="tx1"/>
+    </cs:fontRef>
+    <cs:spPr>
+      <a:ln w="9525" cap="flat" cmpd="sng" algn="ctr">
+        <a:solidFill>
+          <a:schemeClr val="tx1">
+            <a:lumMod val="35000"/>
+            <a:lumOff val="65000"/>
+          </a:schemeClr>
+        </a:solidFill>
+        <a:round/>
+      </a:ln>
+    </cs:spPr>
+  </cs:leaderLine>
+  <cs:legend>
+    <cs:lnRef idx="0"/>
+    <cs:fillRef idx="0"/>
+    <cs:effectRef idx="0"/>
+    <cs:fontRef idx="minor">
+      <a:schemeClr val="tx1">
+        <a:lumMod val="65000"/>
+        <a:lumOff val="35000"/>
+      </a:schemeClr>
+    </cs:fontRef>
+    <cs:defRPr sz="900" kern="1200"/>
+  </cs:legend>
+  <cs:plotArea mods="allowNoFillOverride allowNoLineOverride">
+    <cs:lnRef idx="0"/>
+    <cs:fillRef idx="0"/>
+    <cs:effectRef idx="0"/>
+    <cs:fontRef idx="minor">
+      <a:schemeClr val="tx1"/>
+    </cs:fontRef>
+  </cs:plotArea>
+  <cs:plotArea3D mods="allowNoFillOverride allowNoLineOverride">
+    <cs:lnRef idx="0"/>
+    <cs:fillRef idx="0"/>
+    <cs:effectRef idx="0"/>
+    <cs:fontRef idx="minor">
+      <a:schemeClr val="tx1"/>
+    </cs:fontRef>
+  </cs:plotArea3D>
+  <cs:seriesAxis>
+    <cs:lnRef idx="0"/>
+    <cs:fillRef idx="0"/>
+    <cs:effectRef idx="0"/>
+    <cs:fontRef idx="minor">
+      <a:schemeClr val="tx1">
+        <a:lumMod val="65000"/>
+        <a:lumOff val="35000"/>
+      </a:schemeClr>
+    </cs:fontRef>
+    <cs:defRPr sz="900" kern="1200"/>
+  </cs:seriesAxis>
+  <cs:seriesLine>
+    <cs:lnRef idx="0"/>
+    <cs:fillRef idx="0"/>
+    <cs:effectRef idx="0"/>
+    <cs:fontRef idx="minor">
+      <a:schemeClr val="tx1"/>
+    </cs:fontRef>
+    <cs:spPr>
+      <a:ln w="9525" cap="flat" cmpd="sng" algn="ctr">
+        <a:solidFill>
+          <a:schemeClr val="tx1">
+            <a:lumMod val="35000"/>
+            <a:lumOff val="65000"/>
+          </a:schemeClr>
+        </a:solidFill>
+        <a:round/>
+      </a:ln>
+    </cs:spPr>
+  </cs:seriesLine>
+  <cs:title>
+    <cs:lnRef idx="0"/>
+    <cs:fillRef idx="0"/>
+    <cs:effectRef idx="0"/>
+    <cs:fontRef idx="minor">
+      <a:schemeClr val="tx1">
+        <a:lumMod val="65000"/>
+        <a:lumOff val="35000"/>
+      </a:schemeClr>
+    </cs:fontRef>
+    <cs:defRPr sz="1400" b="0" kern="1200" spc="0" baseline="0"/>
+  </cs:title>
+  <cs:trendline>
+    <cs:lnRef idx="0">
+      <cs:styleClr val="auto"/>
+    </cs:lnRef>
+    <cs:fillRef idx="0"/>
+    <cs:effectRef idx="0"/>
+    <cs:fontRef idx="minor">
+      <a:schemeClr val="tx1"/>
+    </cs:fontRef>
+    <cs:spPr>
+      <a:ln w="19050" cap="rnd">
+        <a:solidFill>
+          <a:schemeClr val="phClr"/>
+        </a:solidFill>
+        <a:prstDash val="sysDot"/>
+      </a:ln>
+    </cs:spPr>
+  </cs:trendline>
+  <cs:trendlineLabel>
+    <cs:lnRef idx="0"/>
+    <cs:fillRef idx="0"/>
+    <cs:effectRef idx="0"/>
+    <cs:fontRef idx="minor">
+      <a:schemeClr val="tx1">
+        <a:lumMod val="65000"/>
+        <a:lumOff val="35000"/>
+      </a:schemeClr>
+    </cs:fontRef>
+    <cs:defRPr sz="900" kern="1200"/>
+  </cs:trendlineLabel>
+  <cs:upBar>
+    <cs:lnRef idx="0"/>
+    <cs:fillRef idx="0"/>
+    <cs:effectRef idx="0"/>
+    <cs:fontRef idx="minor">
+      <a:schemeClr val="dk1"/>
+    </cs:fontRef>
+    <cs:spPr>
+      <a:solidFill>
+        <a:schemeClr val="lt1"/>
+      </a:solidFill>
+      <a:ln w="9525">
+        <a:solidFill>
+          <a:schemeClr val="tx1">
+            <a:lumMod val="15000"/>
+            <a:lumOff val="85000"/>
+          </a:schemeClr>
+        </a:solidFill>
+      </a:ln>
+    </cs:spPr>
+  </cs:upBar>
+  <cs:valueAxis>
+    <cs:lnRef idx="0"/>
+    <cs:fillRef idx="0"/>
+    <cs:effectRef idx="0"/>
+    <cs:fontRef idx="minor">
+      <a:schemeClr val="tx1">
+        <a:lumMod val="65000"/>
+        <a:lumOff val="35000"/>
+      </a:schemeClr>
+    </cs:fontRef>
+    <cs:defRPr sz="900" kern="1200"/>
+  </cs:valueAxis>
+  <cs:wall>
+    <cs:lnRef idx="0"/>
+    <cs:fillRef idx="0"/>
+    <cs:effectRef idx="0"/>
+    <cs:fontRef idx="minor">
+      <a:schemeClr val="tx1"/>
+    </cs:fontRef>
+    <cs:spPr>
+      <a:noFill/>
+      <a:ln>
+        <a:noFill/>
+      </a:ln>
+    </cs:spPr>
+  </cs:wall>
+</cs:chartStyle>
+</file>
+
+<file path=ppt/charts/style9.xml><?xml version="1.0" encoding="utf-8"?>
 <cs:chartStyle xmlns:cs="http://schemas.microsoft.com/office/drawing/2012/chartStyle" xmlns:a="http://schemas.openxmlformats.org/drawingml/2006/main" id="227">
   <cs:axisTitle>
     <cs:lnRef idx="0"/>
@@ -5432,7 +9547,7 @@
           <a:p>
             <a:fld id="{9410D272-305C-421E-A9EF-95D63D599B42}" type="datetimeFigureOut">
               <a:rPr lang="en-US" smtClean="0"/>
-              <a:t>3/7/23</a:t>
+              <a:t>4/29/23</a:t>
             </a:fld>
             <a:endParaRPr lang="en-US" dirty="0"/>
           </a:p>
@@ -5609,7 +9724,7 @@
           <a:p>
             <a:fld id="{05E16E63-7886-43BC-8DD4-4F14C3DD7360}" type="datetimeFigureOut">
               <a:rPr lang="en-US" smtClean="0"/>
-              <a:t>3/7/23</a:t>
+              <a:t>4/29/23</a:t>
             </a:fld>
             <a:endParaRPr lang="en-US" dirty="0"/>
           </a:p>
@@ -9989,7 +14104,7 @@
           <a:p>
             <a:r>
               <a:rPr lang="en-US" dirty="0"/>
-              <a:t>Team Velocity</a:t>
+              <a:t>Team Velocity- Sprint 1</a:t>
             </a:r>
           </a:p>
         </p:txBody>
@@ -10073,13 +14188,13 @@
         <p:spPr/>
         <p:txBody>
           <a:bodyPr>
-            <a:normAutofit fontScale="90000"/>
+            <a:noAutofit/>
           </a:bodyPr>
           <a:lstStyle/>
           <a:p>
             <a:r>
-              <a:rPr lang="en-US" dirty="0"/>
-              <a:t>Completed/Committed Ratio</a:t>
+              <a:rPr lang="en-US" sz="4000" dirty="0"/>
+              <a:t>Completed/Committed Ratio- Sprint 1</a:t>
             </a:r>
           </a:p>
         </p:txBody>
@@ -10429,7 +14544,7 @@
           <a:p>
             <a:r>
               <a:rPr lang="en-US" dirty="0"/>
-              <a:t>Burndown Charts</a:t>
+              <a:t>Burndown Charts- Sprint 1</a:t>
             </a:r>
           </a:p>
         </p:txBody>
@@ -10528,6 +14643,560 @@
     <p:extLst>
       <p:ext uri="{BB962C8B-B14F-4D97-AF65-F5344CB8AC3E}">
         <p14:creationId xmlns:p14="http://schemas.microsoft.com/office/powerpoint/2010/main" val="2596023180"/>
+      </p:ext>
+    </p:extLst>
+  </p:cSld>
+  <p:clrMapOvr>
+    <a:masterClrMapping/>
+  </p:clrMapOvr>
+</p:sld>
+</file>
+
+<file path=ppt/slides/slide4.xml><?xml version="1.0" encoding="utf-8"?>
+<p:sld xmlns:a="http://schemas.openxmlformats.org/drawingml/2006/main" xmlns:r="http://schemas.openxmlformats.org/officeDocument/2006/relationships" xmlns:p="http://schemas.openxmlformats.org/presentationml/2006/main">
+  <p:cSld>
+    <p:spTree>
+      <p:nvGrpSpPr>
+        <p:cNvPr id="1" name=""/>
+        <p:cNvGrpSpPr/>
+        <p:nvPr/>
+      </p:nvGrpSpPr>
+      <p:grpSpPr>
+        <a:xfrm>
+          <a:off x="0" y="0"/>
+          <a:ext cx="0" cy="0"/>
+          <a:chOff x="0" y="0"/>
+          <a:chExt cx="0" cy="0"/>
+        </a:xfrm>
+      </p:grpSpPr>
+      <p:sp>
+        <p:nvSpPr>
+          <p:cNvPr id="2" name="Title 1">
+            <a:extLst>
+              <a:ext uri="{FF2B5EF4-FFF2-40B4-BE49-F238E27FC236}">
+                <a16:creationId xmlns:a16="http://schemas.microsoft.com/office/drawing/2014/main" id="{0DC7CCEF-87A1-E52A-486A-3D906580B0FF}"/>
+              </a:ext>
+            </a:extLst>
+          </p:cNvPr>
+          <p:cNvSpPr>
+            <a:spLocks noGrp="1"/>
+          </p:cNvSpPr>
+          <p:nvPr>
+            <p:ph type="title"/>
+          </p:nvPr>
+        </p:nvSpPr>
+        <p:spPr/>
+        <p:txBody>
+          <a:bodyPr>
+            <a:normAutofit fontScale="90000"/>
+          </a:bodyPr>
+          <a:lstStyle/>
+          <a:p>
+            <a:r>
+              <a:rPr lang="en-US" dirty="0"/>
+              <a:t>Team Velocity- Sprint 2</a:t>
+            </a:r>
+          </a:p>
+        </p:txBody>
+      </p:sp>
+      <p:graphicFrame>
+        <p:nvGraphicFramePr>
+          <p:cNvPr id="4" name="Content Placeholder 7">
+            <a:extLst>
+              <a:ext uri="{FF2B5EF4-FFF2-40B4-BE49-F238E27FC236}">
+                <a16:creationId xmlns:a16="http://schemas.microsoft.com/office/drawing/2014/main" id="{86E804A1-AA93-3935-BA42-86ABA7532B09}"/>
+              </a:ext>
+            </a:extLst>
+          </p:cNvPr>
+          <p:cNvGraphicFramePr>
+            <a:graphicFrameLocks/>
+          </p:cNvGraphicFramePr>
+          <p:nvPr>
+            <p:extLst>
+              <p:ext uri="{D42A27DB-BD31-4B8C-83A1-F6EECF244321}">
+                <p14:modId xmlns:p14="http://schemas.microsoft.com/office/powerpoint/2010/main" val="3948208217"/>
+              </p:ext>
+            </p:extLst>
+          </p:nvPr>
+        </p:nvGraphicFramePr>
+        <p:xfrm>
+          <a:off x="3247231" y="2127251"/>
+          <a:ext cx="5697537" cy="3473450"/>
+        </p:xfrm>
+        <a:graphic>
+          <a:graphicData uri="http://schemas.openxmlformats.org/drawingml/2006/chart">
+            <c:chart xmlns:c="http://schemas.openxmlformats.org/drawingml/2006/chart" xmlns:r="http://schemas.openxmlformats.org/officeDocument/2006/relationships" r:id="rId2"/>
+          </a:graphicData>
+        </a:graphic>
+      </p:graphicFrame>
+    </p:spTree>
+    <p:extLst>
+      <p:ext uri="{BB962C8B-B14F-4D97-AF65-F5344CB8AC3E}">
+        <p14:creationId xmlns:p14="http://schemas.microsoft.com/office/powerpoint/2010/main" val="30997167"/>
+      </p:ext>
+    </p:extLst>
+  </p:cSld>
+  <p:clrMapOvr>
+    <a:masterClrMapping/>
+  </p:clrMapOvr>
+</p:sld>
+</file>
+
+<file path=ppt/slides/slide5.xml><?xml version="1.0" encoding="utf-8"?>
+<p:sld xmlns:a="http://schemas.openxmlformats.org/drawingml/2006/main" xmlns:r="http://schemas.openxmlformats.org/officeDocument/2006/relationships" xmlns:p="http://schemas.openxmlformats.org/presentationml/2006/main">
+  <p:cSld>
+    <p:spTree>
+      <p:nvGrpSpPr>
+        <p:cNvPr id="1" name=""/>
+        <p:cNvGrpSpPr/>
+        <p:nvPr/>
+      </p:nvGrpSpPr>
+      <p:grpSpPr>
+        <a:xfrm>
+          <a:off x="0" y="0"/>
+          <a:ext cx="0" cy="0"/>
+          <a:chOff x="0" y="0"/>
+          <a:chExt cx="0" cy="0"/>
+        </a:xfrm>
+      </p:grpSpPr>
+      <p:sp>
+        <p:nvSpPr>
+          <p:cNvPr id="2" name="Title 1">
+            <a:extLst>
+              <a:ext uri="{FF2B5EF4-FFF2-40B4-BE49-F238E27FC236}">
+                <a16:creationId xmlns:a16="http://schemas.microsoft.com/office/drawing/2014/main" id="{F93E2D52-CFFA-EF0A-C609-1505D73EB772}"/>
+              </a:ext>
+            </a:extLst>
+          </p:cNvPr>
+          <p:cNvSpPr>
+            <a:spLocks noGrp="1"/>
+          </p:cNvSpPr>
+          <p:nvPr>
+            <p:ph type="title"/>
+          </p:nvPr>
+        </p:nvSpPr>
+        <p:spPr/>
+        <p:txBody>
+          <a:bodyPr>
+            <a:noAutofit/>
+          </a:bodyPr>
+          <a:lstStyle/>
+          <a:p>
+            <a:r>
+              <a:rPr lang="en-US" sz="4000" dirty="0"/>
+              <a:t>Completed/Committed Ratio- Sprint 2</a:t>
+            </a:r>
+          </a:p>
+        </p:txBody>
+      </p:sp>
+      <p:graphicFrame>
+        <p:nvGraphicFramePr>
+          <p:cNvPr id="4" name="Content Placeholder 3">
+            <a:extLst>
+              <a:ext uri="{FF2B5EF4-FFF2-40B4-BE49-F238E27FC236}">
+                <a16:creationId xmlns:a16="http://schemas.microsoft.com/office/drawing/2014/main" id="{801F2050-0A50-DB8A-2976-2B468907AC1B}"/>
+              </a:ext>
+            </a:extLst>
+          </p:cNvPr>
+          <p:cNvGraphicFramePr>
+            <a:graphicFrameLocks noGrp="1"/>
+          </p:cNvGraphicFramePr>
+          <p:nvPr>
+            <p:ph sz="quarter" idx="14"/>
+          </p:nvPr>
+        </p:nvGraphicFramePr>
+        <p:xfrm>
+          <a:off x="931863" y="1695450"/>
+          <a:ext cx="10328275" cy="4314825"/>
+        </p:xfrm>
+        <a:graphic>
+          <a:graphicData uri="http://schemas.openxmlformats.org/drawingml/2006/chart">
+            <c:chart xmlns:c="http://schemas.openxmlformats.org/drawingml/2006/chart" xmlns:r="http://schemas.openxmlformats.org/officeDocument/2006/relationships" r:id="rId2"/>
+          </a:graphicData>
+        </a:graphic>
+      </p:graphicFrame>
+      <mc:AlternateContent xmlns:mc="http://schemas.openxmlformats.org/markup-compatibility/2006">
+        <mc:Choice xmlns:a14="http://schemas.microsoft.com/office/drawing/2010/main" Requires="a14">
+          <p:sp>
+            <p:nvSpPr>
+              <p:cNvPr id="5" name="TextBox 4">
+                <a:extLst>
+                  <a:ext uri="{FF2B5EF4-FFF2-40B4-BE49-F238E27FC236}">
+                    <a16:creationId xmlns:a16="http://schemas.microsoft.com/office/drawing/2014/main" id="{49272107-44BE-64BF-BBDA-37D33A44BF88}"/>
+                  </a:ext>
+                </a:extLst>
+              </p:cNvPr>
+              <p:cNvSpPr txBox="1"/>
+              <p:nvPr/>
+            </p:nvSpPr>
+            <p:spPr>
+              <a:xfrm>
+                <a:off x="9771738" y="3429000"/>
+                <a:ext cx="1176604" cy="520463"/>
+              </a:xfrm>
+              <a:prstGeom prst="rect">
+                <a:avLst/>
+              </a:prstGeom>
+              <a:noFill/>
+            </p:spPr>
+            <p:txBody>
+              <a:bodyPr wrap="none" lIns="0" tIns="0" rIns="0" bIns="0" rtlCol="0">
+                <a:spAutoFit/>
+              </a:bodyPr>
+              <a:lstStyle/>
+              <a:p>
+                <a:pPr/>
+                <a14:m>
+                  <m:oMathPara xmlns:m="http://schemas.openxmlformats.org/officeDocument/2006/math">
+                    <m:oMathParaPr>
+                      <m:jc m:val="centerGroup"/>
+                    </m:oMathParaPr>
+                    <m:oMath xmlns:m="http://schemas.openxmlformats.org/officeDocument/2006/math">
+                      <m:f>
+                        <m:fPr>
+                          <m:ctrlPr>
+                            <a:rPr lang="en-US" i="1" smtClean="0">
+                              <a:latin typeface="Cambria Math" panose="02040503050406030204" pitchFamily="18" charset="0"/>
+                            </a:rPr>
+                          </m:ctrlPr>
+                        </m:fPr>
+                        <m:num>
+                          <m:r>
+                            <a:rPr lang="en-US" b="0" i="1" smtClean="0">
+                              <a:latin typeface="Cambria Math" panose="02040503050406030204" pitchFamily="18" charset="0"/>
+                            </a:rPr>
+                            <m:t>84</m:t>
+                          </m:r>
+                        </m:num>
+                        <m:den>
+                          <m:r>
+                            <a:rPr lang="en-US" b="0" i="1" smtClean="0">
+                              <a:latin typeface="Cambria Math" panose="02040503050406030204" pitchFamily="18" charset="0"/>
+                            </a:rPr>
+                            <m:t>85</m:t>
+                          </m:r>
+                        </m:den>
+                      </m:f>
+                      <m:r>
+                        <a:rPr lang="en-US" b="0" i="1" smtClean="0">
+                          <a:latin typeface="Cambria Math" panose="02040503050406030204" pitchFamily="18" charset="0"/>
+                        </a:rPr>
+                        <m:t>=0.9</m:t>
+                      </m:r>
+                      <m:r>
+                        <a:rPr lang="en-US" b="0" i="1" smtClean="0">
+                          <a:latin typeface="Cambria Math" panose="02040503050406030204" pitchFamily="18" charset="0"/>
+                        </a:rPr>
+                        <m:t>88</m:t>
+                      </m:r>
+                    </m:oMath>
+                  </m:oMathPara>
+                </a14:m>
+                <a:endParaRPr lang="en-US" dirty="0"/>
+              </a:p>
+            </p:txBody>
+          </p:sp>
+        </mc:Choice>
+        <mc:Fallback>
+          <p:sp>
+            <p:nvSpPr>
+              <p:cNvPr id="5" name="TextBox 4">
+                <a:extLst>
+                  <a:ext uri="{FF2B5EF4-FFF2-40B4-BE49-F238E27FC236}">
+                    <a16:creationId xmlns:a16="http://schemas.microsoft.com/office/drawing/2014/main" id="{49272107-44BE-64BF-BBDA-37D33A44BF88}"/>
+                  </a:ext>
+                </a:extLst>
+              </p:cNvPr>
+              <p:cNvSpPr txBox="1">
+                <a:spLocks noRot="1" noChangeAspect="1" noMove="1" noResize="1" noEditPoints="1" noAdjustHandles="1" noChangeArrowheads="1" noChangeShapeType="1" noTextEdit="1"/>
+              </p:cNvSpPr>
+              <p:nvPr/>
+            </p:nvSpPr>
+            <p:spPr>
+              <a:xfrm>
+                <a:off x="9771738" y="3429000"/>
+                <a:ext cx="1176604" cy="520463"/>
+              </a:xfrm>
+              <a:prstGeom prst="rect">
+                <a:avLst/>
+              </a:prstGeom>
+              <a:blipFill>
+                <a:blip r:embed="rId3"/>
+                <a:stretch>
+                  <a:fillRect l="-4255" t="-7143" r="-3191" b="-11905"/>
+                </a:stretch>
+              </a:blipFill>
+            </p:spPr>
+            <p:txBody>
+              <a:bodyPr/>
+              <a:lstStyle/>
+              <a:p>
+                <a:r>
+                  <a:rPr lang="en-US">
+                    <a:noFill/>
+                  </a:rPr>
+                  <a:t> </a:t>
+                </a:r>
+              </a:p>
+            </p:txBody>
+          </p:sp>
+        </mc:Fallback>
+      </mc:AlternateContent>
+      <mc:AlternateContent xmlns:mc="http://schemas.openxmlformats.org/markup-compatibility/2006" xmlns:a14="http://schemas.microsoft.com/office/drawing/2010/main">
+        <mc:Choice Requires="a14">
+          <p:sp>
+            <p:nvSpPr>
+              <p:cNvPr id="6" name="TextBox 5">
+                <a:extLst>
+                  <a:ext uri="{FF2B5EF4-FFF2-40B4-BE49-F238E27FC236}">
+                    <a16:creationId xmlns:a16="http://schemas.microsoft.com/office/drawing/2014/main" id="{DF72724E-D7C7-9C85-DDF4-FEE3E1BE900B}"/>
+                  </a:ext>
+                </a:extLst>
+              </p:cNvPr>
+              <p:cNvSpPr txBox="1"/>
+              <p:nvPr/>
+            </p:nvSpPr>
+            <p:spPr>
+              <a:xfrm>
+                <a:off x="8975045" y="2924914"/>
+                <a:ext cx="2898229" cy="276999"/>
+              </a:xfrm>
+              <a:prstGeom prst="rect">
+                <a:avLst/>
+              </a:prstGeom>
+              <a:noFill/>
+            </p:spPr>
+            <p:txBody>
+              <a:bodyPr wrap="none" lIns="0" tIns="0" rIns="0" bIns="0" rtlCol="0">
+                <a:spAutoFit/>
+              </a:bodyPr>
+              <a:lstStyle/>
+              <a:p>
+                <a:pPr/>
+                <a14:m>
+                  <m:oMathPara xmlns:m="http://schemas.openxmlformats.org/officeDocument/2006/math">
+                    <m:oMathParaPr>
+                      <m:jc m:val="centerGroup"/>
+                    </m:oMathParaPr>
+                    <m:oMath xmlns:m="http://schemas.openxmlformats.org/officeDocument/2006/math">
+                      <m:r>
+                        <m:rPr>
+                          <m:sty m:val="p"/>
+                        </m:rPr>
+                        <a:rPr lang="en-US" i="0" smtClean="0">
+                          <a:latin typeface="Cambria Math" panose="02040503050406030204" pitchFamily="18" charset="0"/>
+                        </a:rPr>
+                        <m:t>C</m:t>
+                      </m:r>
+                      <m:r>
+                        <m:rPr>
+                          <m:sty m:val="p"/>
+                        </m:rPr>
+                        <a:rPr lang="en-US" b="0" i="0" smtClean="0">
+                          <a:latin typeface="Cambria Math" panose="02040503050406030204" pitchFamily="18" charset="0"/>
+                        </a:rPr>
+                        <m:t>ompleted</m:t>
+                      </m:r>
+                      <m:r>
+                        <a:rPr lang="en-US" b="0" i="0" smtClean="0">
+                          <a:latin typeface="Cambria Math" panose="02040503050406030204" pitchFamily="18" charset="0"/>
+                        </a:rPr>
+                        <m:t>/</m:t>
+                      </m:r>
+                      <m:r>
+                        <m:rPr>
+                          <m:sty m:val="p"/>
+                        </m:rPr>
+                        <a:rPr lang="en-US" b="0" i="0" smtClean="0">
+                          <a:latin typeface="Cambria Math" panose="02040503050406030204" pitchFamily="18" charset="0"/>
+                        </a:rPr>
+                        <m:t>Committed</m:t>
+                      </m:r>
+                      <m:r>
+                        <a:rPr lang="en-US" b="0" i="0" smtClean="0">
+                          <a:latin typeface="Cambria Math" panose="02040503050406030204" pitchFamily="18" charset="0"/>
+                        </a:rPr>
+                        <m:t> </m:t>
+                      </m:r>
+                      <m:r>
+                        <m:rPr>
+                          <m:sty m:val="p"/>
+                        </m:rPr>
+                        <a:rPr lang="en-US" b="0" i="0" smtClean="0">
+                          <a:latin typeface="Cambria Math" panose="02040503050406030204" pitchFamily="18" charset="0"/>
+                        </a:rPr>
+                        <m:t>Ratio</m:t>
+                      </m:r>
+                    </m:oMath>
+                  </m:oMathPara>
+                </a14:m>
+                <a:endParaRPr lang="en-US" dirty="0"/>
+              </a:p>
+            </p:txBody>
+          </p:sp>
+        </mc:Choice>
+        <mc:Fallback xmlns="">
+          <p:sp>
+            <p:nvSpPr>
+              <p:cNvPr id="6" name="TextBox 5">
+                <a:extLst>
+                  <a:ext uri="{FF2B5EF4-FFF2-40B4-BE49-F238E27FC236}">
+                    <a16:creationId xmlns:a16="http://schemas.microsoft.com/office/drawing/2014/main" id="{DF72724E-D7C7-9C85-DDF4-FEE3E1BE900B}"/>
+                  </a:ext>
+                </a:extLst>
+              </p:cNvPr>
+              <p:cNvSpPr txBox="1">
+                <a:spLocks noRot="1" noChangeAspect="1" noMove="1" noResize="1" noEditPoints="1" noAdjustHandles="1" noChangeArrowheads="1" noChangeShapeType="1" noTextEdit="1"/>
+              </p:cNvSpPr>
+              <p:nvPr/>
+            </p:nvSpPr>
+            <p:spPr>
+              <a:xfrm>
+                <a:off x="8975045" y="2924914"/>
+                <a:ext cx="2898229" cy="276999"/>
+              </a:xfrm>
+              <a:prstGeom prst="rect">
+                <a:avLst/>
+              </a:prstGeom>
+              <a:blipFill>
+                <a:blip r:embed="rId4"/>
+                <a:stretch>
+                  <a:fillRect l="-1304" t="-8696" r="-870" b="-34783"/>
+                </a:stretch>
+              </a:blipFill>
+            </p:spPr>
+            <p:txBody>
+              <a:bodyPr/>
+              <a:lstStyle/>
+              <a:p>
+                <a:r>
+                  <a:rPr lang="en-US">
+                    <a:noFill/>
+                  </a:rPr>
+                  <a:t> </a:t>
+                </a:r>
+              </a:p>
+            </p:txBody>
+          </p:sp>
+        </mc:Fallback>
+      </mc:AlternateContent>
+    </p:spTree>
+    <p:extLst>
+      <p:ext uri="{BB962C8B-B14F-4D97-AF65-F5344CB8AC3E}">
+        <p14:creationId xmlns:p14="http://schemas.microsoft.com/office/powerpoint/2010/main" val="2772471222"/>
+      </p:ext>
+    </p:extLst>
+  </p:cSld>
+  <p:clrMapOvr>
+    <a:masterClrMapping/>
+  </p:clrMapOvr>
+</p:sld>
+</file>
+
+<file path=ppt/slides/slide6.xml><?xml version="1.0" encoding="utf-8"?>
+<p:sld xmlns:a="http://schemas.openxmlformats.org/drawingml/2006/main" xmlns:r="http://schemas.openxmlformats.org/officeDocument/2006/relationships" xmlns:p="http://schemas.openxmlformats.org/presentationml/2006/main">
+  <p:cSld>
+    <p:spTree>
+      <p:nvGrpSpPr>
+        <p:cNvPr id="1" name=""/>
+        <p:cNvGrpSpPr/>
+        <p:nvPr/>
+      </p:nvGrpSpPr>
+      <p:grpSpPr>
+        <a:xfrm>
+          <a:off x="0" y="0"/>
+          <a:ext cx="0" cy="0"/>
+          <a:chOff x="0" y="0"/>
+          <a:chExt cx="0" cy="0"/>
+        </a:xfrm>
+      </p:grpSpPr>
+      <p:sp>
+        <p:nvSpPr>
+          <p:cNvPr id="2" name="Title 1">
+            <a:extLst>
+              <a:ext uri="{FF2B5EF4-FFF2-40B4-BE49-F238E27FC236}">
+                <a16:creationId xmlns:a16="http://schemas.microsoft.com/office/drawing/2014/main" id="{097726CA-6E97-2F07-BA29-B77DD7CE736C}"/>
+              </a:ext>
+            </a:extLst>
+          </p:cNvPr>
+          <p:cNvSpPr>
+            <a:spLocks noGrp="1"/>
+          </p:cNvSpPr>
+          <p:nvPr>
+            <p:ph type="title"/>
+          </p:nvPr>
+        </p:nvSpPr>
+        <p:spPr/>
+        <p:txBody>
+          <a:bodyPr>
+            <a:normAutofit fontScale="90000"/>
+          </a:bodyPr>
+          <a:lstStyle/>
+          <a:p>
+            <a:r>
+              <a:rPr lang="en-US" dirty="0"/>
+              <a:t>Burndown </a:t>
+            </a:r>
+            <a:r>
+              <a:rPr lang="en-US"/>
+              <a:t>Chart- Sprint 2</a:t>
+            </a:r>
+            <a:endParaRPr lang="en-US" dirty="0"/>
+          </a:p>
+        </p:txBody>
+      </p:sp>
+      <p:graphicFrame>
+        <p:nvGraphicFramePr>
+          <p:cNvPr id="3" name="Chart 2">
+            <a:extLst>
+              <a:ext uri="{FF2B5EF4-FFF2-40B4-BE49-F238E27FC236}">
+                <a16:creationId xmlns:a16="http://schemas.microsoft.com/office/drawing/2014/main" id="{8E341F03-FED5-0FB6-554E-74D2F9067B01}"/>
+              </a:ext>
+            </a:extLst>
+          </p:cNvPr>
+          <p:cNvGraphicFramePr>
+            <a:graphicFrameLocks/>
+          </p:cNvGraphicFramePr>
+          <p:nvPr/>
+        </p:nvGraphicFramePr>
+        <p:xfrm>
+          <a:off x="6319381" y="2024242"/>
+          <a:ext cx="4869636" cy="2809516"/>
+        </p:xfrm>
+        <a:graphic>
+          <a:graphicData uri="http://schemas.openxmlformats.org/drawingml/2006/chart">
+            <c:chart xmlns:c="http://schemas.openxmlformats.org/drawingml/2006/chart" xmlns:r="http://schemas.openxmlformats.org/officeDocument/2006/relationships" r:id="rId2"/>
+          </a:graphicData>
+        </a:graphic>
+      </p:graphicFrame>
+      <p:graphicFrame>
+        <p:nvGraphicFramePr>
+          <p:cNvPr id="7" name="Chart 6">
+            <a:extLst>
+              <a:ext uri="{FF2B5EF4-FFF2-40B4-BE49-F238E27FC236}">
+                <a16:creationId xmlns:a16="http://schemas.microsoft.com/office/drawing/2014/main" id="{5F2FF8A0-871B-AAFD-5798-EFD99E562A8D}"/>
+              </a:ext>
+            </a:extLst>
+          </p:cNvPr>
+          <p:cNvGraphicFramePr>
+            <a:graphicFrameLocks/>
+          </p:cNvGraphicFramePr>
+          <p:nvPr/>
+        </p:nvGraphicFramePr>
+        <p:xfrm>
+          <a:off x="1002983" y="2024242"/>
+          <a:ext cx="4564756" cy="2766221"/>
+        </p:xfrm>
+        <a:graphic>
+          <a:graphicData uri="http://schemas.openxmlformats.org/drawingml/2006/chart">
+            <c:chart xmlns:c="http://schemas.openxmlformats.org/drawingml/2006/chart" xmlns:r="http://schemas.openxmlformats.org/officeDocument/2006/relationships" r:id="rId3"/>
+          </a:graphicData>
+        </a:graphic>
+      </p:graphicFrame>
+    </p:spTree>
+    <p:extLst>
+      <p:ext uri="{BB962C8B-B14F-4D97-AF65-F5344CB8AC3E}">
+        <p14:creationId xmlns:p14="http://schemas.microsoft.com/office/powerpoint/2010/main" val="4175062138"/>
       </p:ext>
     </p:extLst>
   </p:cSld>
@@ -11329,6 +15998,34 @@
 </file>
 
 <file path=customXml/item1.xml><?xml version="1.0" encoding="utf-8"?>
+<p:properties xmlns:p="http://schemas.microsoft.com/office/2006/metadata/properties" xmlns:xsi="http://www.w3.org/2001/XMLSchema-instance" xmlns:pc="http://schemas.microsoft.com/office/infopath/2007/PartnerControls">
+  <documentManagement>
+    <Status xmlns="71af3243-3dd4-4a8d-8c0d-dd76da1f02a5">Not started</Status>
+    <_ip_UnifiedCompliancePolicyUIAction xmlns="http://schemas.microsoft.com/sharepoint/v3" xsi:nil="true"/>
+    <Image xmlns="71af3243-3dd4-4a8d-8c0d-dd76da1f02a5">
+      <Url xsi:nil="true"/>
+      <Description xsi:nil="true"/>
+    </Image>
+    <_ip_UnifiedCompliancePolicyProperties xmlns="http://schemas.microsoft.com/sharepoint/v3" xsi:nil="true"/>
+    <ImageTagsTaxHTField xmlns="71af3243-3dd4-4a8d-8c0d-dd76da1f02a5">
+      <Terms xmlns="http://schemas.microsoft.com/office/infopath/2007/PartnerControls"/>
+    </ImageTagsTaxHTField>
+    <TaxCatchAll xmlns="230e9df3-be65-4c73-a93b-d1236ebd677e"/>
+    <MediaServiceKeyPoints xmlns="71af3243-3dd4-4a8d-8c0d-dd76da1f02a5" xsi:nil="true"/>
+  </documentManagement>
+</p:properties>
+</file>
+
+<file path=customXml/item2.xml><?xml version="1.0" encoding="utf-8"?>
+<?mso-contentType ?>
+<FormTemplates xmlns="http://schemas.microsoft.com/sharepoint/v3/contenttype/forms">
+  <Display>DocumentLibraryForm</Display>
+  <Edit>DocumentLibraryForm</Edit>
+  <New>DocumentLibraryForm</New>
+</FormTemplates>
+</file>
+
+<file path=customXml/item3.xml><?xml version="1.0" encoding="utf-8"?>
 <ct:contentTypeSchema xmlns:ct="http://schemas.microsoft.com/office/2006/metadata/contentType" xmlns:ma="http://schemas.microsoft.com/office/2006/metadata/properties/metaAttributes" ct:_="" ma:_="" ma:contentTypeName="Document" ma:contentTypeID="0x01010079F111ED35F8CC479449609E8A0923A6" ma:contentTypeVersion="20" ma:contentTypeDescription="Create a new document." ma:contentTypeScope="" ma:versionID="1267097ee5f5874adfcc408041ae252e">
   <xsd:schema xmlns:xsd="http://www.w3.org/2001/XMLSchema" xmlns:xs="http://www.w3.org/2001/XMLSchema" xmlns:p="http://schemas.microsoft.com/office/2006/metadata/properties" xmlns:ns1="http://schemas.microsoft.com/sharepoint/v3" xmlns:ns2="71af3243-3dd4-4a8d-8c0d-dd76da1f02a5" xmlns:ns3="16c05727-aa75-4e4a-9b5f-8a80a1165891" xmlns:ns4="230e9df3-be65-4c73-a93b-d1236ebd677e" targetNamespace="http://schemas.microsoft.com/office/2006/metadata/properties" ma:root="true" ma:fieldsID="395891a93df65b14727750f2c06c306c" ns1:_="" ns2:_="" ns3:_="" ns4:_="">
     <xsd:import namespace="http://schemas.microsoft.com/sharepoint/v3"/>
@@ -11604,35 +16301,27 @@
 </ct:contentTypeSchema>
 </file>
 
-<file path=customXml/item2.xml><?xml version="1.0" encoding="utf-8"?>
-<?mso-contentType ?>
-<FormTemplates xmlns="http://schemas.microsoft.com/sharepoint/v3/contenttype/forms">
-  <Display>DocumentLibraryForm</Display>
-  <Edit>DocumentLibraryForm</Edit>
-  <New>DocumentLibraryForm</New>
-</FormTemplates>
+<file path=customXml/itemProps1.xml><?xml version="1.0" encoding="utf-8"?>
+<ds:datastoreItem xmlns:ds="http://schemas.openxmlformats.org/officeDocument/2006/customXml" ds:itemID="{42A742F3-D2BE-4CC5-9066-2DB838FE2FFD}">
+  <ds:schemaRefs>
+    <ds:schemaRef ds:uri="http://schemas.microsoft.com/office/2006/metadata/properties"/>
+    <ds:schemaRef ds:uri="http://schemas.microsoft.com/office/infopath/2007/PartnerControls"/>
+    <ds:schemaRef ds:uri="71af3243-3dd4-4a8d-8c0d-dd76da1f02a5"/>
+    <ds:schemaRef ds:uri="http://schemas.microsoft.com/sharepoint/v3"/>
+    <ds:schemaRef ds:uri="230e9df3-be65-4c73-a93b-d1236ebd677e"/>
+  </ds:schemaRefs>
+</ds:datastoreItem>
 </file>
 
-<file path=customXml/item3.xml><?xml version="1.0" encoding="utf-8"?>
-<p:properties xmlns:p="http://schemas.microsoft.com/office/2006/metadata/properties" xmlns:xsi="http://www.w3.org/2001/XMLSchema-instance" xmlns:pc="http://schemas.microsoft.com/office/infopath/2007/PartnerControls">
-  <documentManagement>
-    <Status xmlns="71af3243-3dd4-4a8d-8c0d-dd76da1f02a5">Not started</Status>
-    <_ip_UnifiedCompliancePolicyUIAction xmlns="http://schemas.microsoft.com/sharepoint/v3" xsi:nil="true"/>
-    <Image xmlns="71af3243-3dd4-4a8d-8c0d-dd76da1f02a5">
-      <Url xsi:nil="true"/>
-      <Description xsi:nil="true"/>
-    </Image>
-    <_ip_UnifiedCompliancePolicyProperties xmlns="http://schemas.microsoft.com/sharepoint/v3" xsi:nil="true"/>
-    <ImageTagsTaxHTField xmlns="71af3243-3dd4-4a8d-8c0d-dd76da1f02a5">
-      <Terms xmlns="http://schemas.microsoft.com/office/infopath/2007/PartnerControls"/>
-    </ImageTagsTaxHTField>
-    <TaxCatchAll xmlns="230e9df3-be65-4c73-a93b-d1236ebd677e"/>
-    <MediaServiceKeyPoints xmlns="71af3243-3dd4-4a8d-8c0d-dd76da1f02a5" xsi:nil="true"/>
-  </documentManagement>
-</p:properties>
+<file path=customXml/itemProps2.xml><?xml version="1.0" encoding="utf-8"?>
+<ds:datastoreItem xmlns:ds="http://schemas.openxmlformats.org/officeDocument/2006/customXml" ds:itemID="{959152A6-D9F2-46C7-B217-D613495E7AFF}">
+  <ds:schemaRefs>
+    <ds:schemaRef ds:uri="http://schemas.microsoft.com/sharepoint/v3/contenttype/forms"/>
+  </ds:schemaRefs>
+</ds:datastoreItem>
 </file>
 
-<file path=customXml/itemProps1.xml><?xml version="1.0" encoding="utf-8"?>
+<file path=customXml/itemProps3.xml><?xml version="1.0" encoding="utf-8"?>
 <ds:datastoreItem xmlns:ds="http://schemas.openxmlformats.org/officeDocument/2006/customXml" ds:itemID="{AD1F2201-AEB8-4954-A8CB-3AC4242CC73C}">
   <ds:schemaRefs>
     <ds:schemaRef ds:uri="http://schemas.microsoft.com/office/2006/metadata/contentType"/>
@@ -11653,26 +16342,6 @@
 </ds:datastoreItem>
 </file>
 
-<file path=customXml/itemProps2.xml><?xml version="1.0" encoding="utf-8"?>
-<ds:datastoreItem xmlns:ds="http://schemas.openxmlformats.org/officeDocument/2006/customXml" ds:itemID="{959152A6-D9F2-46C7-B217-D613495E7AFF}">
-  <ds:schemaRefs>
-    <ds:schemaRef ds:uri="http://schemas.microsoft.com/sharepoint/v3/contenttype/forms"/>
-  </ds:schemaRefs>
-</ds:datastoreItem>
-</file>
-
-<file path=customXml/itemProps3.xml><?xml version="1.0" encoding="utf-8"?>
-<ds:datastoreItem xmlns:ds="http://schemas.openxmlformats.org/officeDocument/2006/customXml" ds:itemID="{42A742F3-D2BE-4CC5-9066-2DB838FE2FFD}">
-  <ds:schemaRefs>
-    <ds:schemaRef ds:uri="http://schemas.microsoft.com/office/2006/metadata/properties"/>
-    <ds:schemaRef ds:uri="http://schemas.microsoft.com/office/infopath/2007/PartnerControls"/>
-    <ds:schemaRef ds:uri="71af3243-3dd4-4a8d-8c0d-dd76da1f02a5"/>
-    <ds:schemaRef ds:uri="http://schemas.microsoft.com/sharepoint/v3"/>
-    <ds:schemaRef ds:uri="230e9df3-be65-4c73-a93b-d1236ebd677e"/>
-  </ds:schemaRefs>
-</ds:datastoreItem>
-</file>
-
 <file path=docMetadata/LabelInfo.xml><?xml version="1.0" encoding="utf-8"?>
 <clbl:labelList xmlns:clbl="http://schemas.microsoft.com/office/2020/mipLabelMetadata">
   <clbl:label id="{f42aa342-8706-4288-bd11-ebb85995028c}" enabled="1" method="Standard" siteId="{72f988bf-86f1-41af-91ab-2d7cd011db47}" contentBits="0" removed="0"/>

</xml_diff>